<commit_message>
Presentation + vkr, delete *.iml
</commit_message>
<xml_diff>
--- a/Диплом презентация.pptx
+++ b/Диплом презентация.pptx
@@ -4,6 +4,9 @@
   <p:sldMasterIdLst>
     <p:sldMasterId id="2147483648" r:id="rId1"/>
   </p:sldMasterIdLst>
+  <p:notesMasterIdLst>
+    <p:notesMasterId r:id="rId23"/>
+  </p:notesMasterIdLst>
   <p:sldIdLst>
     <p:sldId id="256" r:id="rId2"/>
     <p:sldId id="257" r:id="rId3"/>
@@ -15,21 +18,17 @@
     <p:sldId id="283" r:id="rId9"/>
     <p:sldId id="260" r:id="rId10"/>
     <p:sldId id="270" r:id="rId11"/>
-    <p:sldId id="271" r:id="rId12"/>
-    <p:sldId id="262" r:id="rId13"/>
-    <p:sldId id="263" r:id="rId14"/>
-    <p:sldId id="264" r:id="rId15"/>
-    <p:sldId id="272" r:id="rId16"/>
-    <p:sldId id="273" r:id="rId17"/>
-    <p:sldId id="265" r:id="rId18"/>
-    <p:sldId id="268" r:id="rId19"/>
-    <p:sldId id="274" r:id="rId20"/>
-    <p:sldId id="275" r:id="rId21"/>
-    <p:sldId id="276" r:id="rId22"/>
-    <p:sldId id="277" r:id="rId23"/>
-    <p:sldId id="278" r:id="rId24"/>
-    <p:sldId id="279" r:id="rId25"/>
-    <p:sldId id="259" r:id="rId26"/>
+    <p:sldId id="262" r:id="rId12"/>
+    <p:sldId id="263" r:id="rId13"/>
+    <p:sldId id="264" r:id="rId14"/>
+    <p:sldId id="272" r:id="rId15"/>
+    <p:sldId id="265" r:id="rId16"/>
+    <p:sldId id="268" r:id="rId17"/>
+    <p:sldId id="284" r:id="rId18"/>
+    <p:sldId id="276" r:id="rId19"/>
+    <p:sldId id="277" r:id="rId20"/>
+    <p:sldId id="279" r:id="rId21"/>
+    <p:sldId id="259" r:id="rId22"/>
   </p:sldIdLst>
   <p:sldSz cx="9144000" cy="6858000" type="screen4x3"/>
   <p:notesSz cx="6858000" cy="9144000"/>
@@ -131,6 +130,437 @@
 </p:presentation>
 </file>
 
+<file path=ppt/notesMasters/notesMaster1.xml><?xml version="1.0" encoding="utf-8"?>
+<p:notesMaster xmlns:a="http://schemas.openxmlformats.org/drawingml/2006/main" xmlns:r="http://schemas.openxmlformats.org/officeDocument/2006/relationships" xmlns:p="http://schemas.openxmlformats.org/presentationml/2006/main">
+  <p:cSld>
+    <p:bg>
+      <p:bgRef idx="1001">
+        <a:schemeClr val="bg1"/>
+      </p:bgRef>
+    </p:bg>
+    <p:spTree>
+      <p:nvGrpSpPr>
+        <p:cNvPr id="1" name=""/>
+        <p:cNvGrpSpPr/>
+        <p:nvPr/>
+      </p:nvGrpSpPr>
+      <p:grpSpPr>
+        <a:xfrm>
+          <a:off x="0" y="0"/>
+          <a:ext cx="0" cy="0"/>
+          <a:chOff x="0" y="0"/>
+          <a:chExt cx="0" cy="0"/>
+        </a:xfrm>
+      </p:grpSpPr>
+      <p:sp>
+        <p:nvSpPr>
+          <p:cNvPr id="2" name="Верхний колонтитул 1"/>
+          <p:cNvSpPr>
+            <a:spLocks noGrp="1"/>
+          </p:cNvSpPr>
+          <p:nvPr>
+            <p:ph type="hdr" sz="quarter"/>
+          </p:nvPr>
+        </p:nvSpPr>
+        <p:spPr>
+          <a:xfrm>
+            <a:off x="0" y="0"/>
+            <a:ext cx="2971800" cy="457200"/>
+          </a:xfrm>
+          <a:prstGeom prst="rect">
+            <a:avLst/>
+          </a:prstGeom>
+        </p:spPr>
+        <p:txBody>
+          <a:bodyPr vert="horz" lIns="91440" tIns="45720" rIns="91440" bIns="45720" rtlCol="0"/>
+          <a:lstStyle>
+            <a:lvl1pPr algn="l">
+              <a:defRPr sz="1200"/>
+            </a:lvl1pPr>
+          </a:lstStyle>
+          <a:p>
+            <a:endParaRPr lang="ru-RU"/>
+          </a:p>
+        </p:txBody>
+      </p:sp>
+      <p:sp>
+        <p:nvSpPr>
+          <p:cNvPr id="3" name="Дата 2"/>
+          <p:cNvSpPr>
+            <a:spLocks noGrp="1"/>
+          </p:cNvSpPr>
+          <p:nvPr>
+            <p:ph type="dt" idx="1"/>
+          </p:nvPr>
+        </p:nvSpPr>
+        <p:spPr>
+          <a:xfrm>
+            <a:off x="3884613" y="0"/>
+            <a:ext cx="2971800" cy="457200"/>
+          </a:xfrm>
+          <a:prstGeom prst="rect">
+            <a:avLst/>
+          </a:prstGeom>
+        </p:spPr>
+        <p:txBody>
+          <a:bodyPr vert="horz" lIns="91440" tIns="45720" rIns="91440" bIns="45720" rtlCol="0"/>
+          <a:lstStyle>
+            <a:lvl1pPr algn="r">
+              <a:defRPr sz="1200"/>
+            </a:lvl1pPr>
+          </a:lstStyle>
+          <a:p>
+            <a:fld id="{DC09B85A-08DB-46DD-AF57-0C9727A23FC3}" type="datetimeFigureOut">
+              <a:rPr lang="ru-RU" smtClean="0"/>
+              <a:pPr/>
+              <a:t>09.06.2013</a:t>
+            </a:fld>
+            <a:endParaRPr lang="ru-RU"/>
+          </a:p>
+        </p:txBody>
+      </p:sp>
+      <p:sp>
+        <p:nvSpPr>
+          <p:cNvPr id="4" name="Образ слайда 3"/>
+          <p:cNvSpPr>
+            <a:spLocks noGrp="1" noRot="1" noChangeAspect="1"/>
+          </p:cNvSpPr>
+          <p:nvPr>
+            <p:ph type="sldImg" idx="2"/>
+          </p:nvPr>
+        </p:nvSpPr>
+        <p:spPr>
+          <a:xfrm>
+            <a:off x="1143000" y="685800"/>
+            <a:ext cx="4572000" cy="3429000"/>
+          </a:xfrm>
+          <a:prstGeom prst="rect">
+            <a:avLst/>
+          </a:prstGeom>
+          <a:noFill/>
+          <a:ln w="12700">
+            <a:solidFill>
+              <a:prstClr val="black"/>
+            </a:solidFill>
+          </a:ln>
+        </p:spPr>
+        <p:txBody>
+          <a:bodyPr vert="horz" lIns="91440" tIns="45720" rIns="91440" bIns="45720" rtlCol="0" anchor="ctr"/>
+          <a:lstStyle/>
+          <a:p>
+            <a:endParaRPr lang="ru-RU"/>
+          </a:p>
+        </p:txBody>
+      </p:sp>
+      <p:sp>
+        <p:nvSpPr>
+          <p:cNvPr id="5" name="Заметки 4"/>
+          <p:cNvSpPr>
+            <a:spLocks noGrp="1"/>
+          </p:cNvSpPr>
+          <p:nvPr>
+            <p:ph type="body" sz="quarter" idx="3"/>
+          </p:nvPr>
+        </p:nvSpPr>
+        <p:spPr>
+          <a:xfrm>
+            <a:off x="685800" y="4343400"/>
+            <a:ext cx="5486400" cy="4114800"/>
+          </a:xfrm>
+          <a:prstGeom prst="rect">
+            <a:avLst/>
+          </a:prstGeom>
+        </p:spPr>
+        <p:txBody>
+          <a:bodyPr vert="horz" lIns="91440" tIns="45720" rIns="91440" bIns="45720" rtlCol="0">
+            <a:normAutofit/>
+          </a:bodyPr>
+          <a:lstStyle/>
+          <a:p>
+            <a:pPr lvl="0"/>
+            <a:r>
+              <a:rPr lang="ru-RU" smtClean="0"/>
+              <a:t>Образец текста</a:t>
+            </a:r>
+          </a:p>
+          <a:p>
+            <a:pPr lvl="1"/>
+            <a:r>
+              <a:rPr lang="ru-RU" smtClean="0"/>
+              <a:t>Второй уровень</a:t>
+            </a:r>
+          </a:p>
+          <a:p>
+            <a:pPr lvl="2"/>
+            <a:r>
+              <a:rPr lang="ru-RU" smtClean="0"/>
+              <a:t>Третий уровень</a:t>
+            </a:r>
+          </a:p>
+          <a:p>
+            <a:pPr lvl="3"/>
+            <a:r>
+              <a:rPr lang="ru-RU" smtClean="0"/>
+              <a:t>Четвертый уровень</a:t>
+            </a:r>
+          </a:p>
+          <a:p>
+            <a:pPr lvl="4"/>
+            <a:r>
+              <a:rPr lang="ru-RU" smtClean="0"/>
+              <a:t>Пятый уровень</a:t>
+            </a:r>
+            <a:endParaRPr lang="ru-RU"/>
+          </a:p>
+        </p:txBody>
+      </p:sp>
+      <p:sp>
+        <p:nvSpPr>
+          <p:cNvPr id="6" name="Нижний колонтитул 5"/>
+          <p:cNvSpPr>
+            <a:spLocks noGrp="1"/>
+          </p:cNvSpPr>
+          <p:nvPr>
+            <p:ph type="ftr" sz="quarter" idx="4"/>
+          </p:nvPr>
+        </p:nvSpPr>
+        <p:spPr>
+          <a:xfrm>
+            <a:off x="0" y="8685213"/>
+            <a:ext cx="2971800" cy="457200"/>
+          </a:xfrm>
+          <a:prstGeom prst="rect">
+            <a:avLst/>
+          </a:prstGeom>
+        </p:spPr>
+        <p:txBody>
+          <a:bodyPr vert="horz" lIns="91440" tIns="45720" rIns="91440" bIns="45720" rtlCol="0" anchor="b"/>
+          <a:lstStyle>
+            <a:lvl1pPr algn="l">
+              <a:defRPr sz="1200"/>
+            </a:lvl1pPr>
+          </a:lstStyle>
+          <a:p>
+            <a:endParaRPr lang="ru-RU"/>
+          </a:p>
+        </p:txBody>
+      </p:sp>
+      <p:sp>
+        <p:nvSpPr>
+          <p:cNvPr id="7" name="Номер слайда 6"/>
+          <p:cNvSpPr>
+            <a:spLocks noGrp="1"/>
+          </p:cNvSpPr>
+          <p:nvPr>
+            <p:ph type="sldNum" sz="quarter" idx="5"/>
+          </p:nvPr>
+        </p:nvSpPr>
+        <p:spPr>
+          <a:xfrm>
+            <a:off x="3884613" y="8685213"/>
+            <a:ext cx="2971800" cy="457200"/>
+          </a:xfrm>
+          <a:prstGeom prst="rect">
+            <a:avLst/>
+          </a:prstGeom>
+        </p:spPr>
+        <p:txBody>
+          <a:bodyPr vert="horz" lIns="91440" tIns="45720" rIns="91440" bIns="45720" rtlCol="0" anchor="b"/>
+          <a:lstStyle>
+            <a:lvl1pPr algn="r">
+              <a:defRPr sz="1200"/>
+            </a:lvl1pPr>
+          </a:lstStyle>
+          <a:p>
+            <a:fld id="{7B282D97-E781-498E-BB32-5DDF5A414349}" type="slidenum">
+              <a:rPr lang="ru-RU" smtClean="0"/>
+              <a:pPr/>
+              <a:t>‹#›</a:t>
+            </a:fld>
+            <a:endParaRPr lang="ru-RU"/>
+          </a:p>
+        </p:txBody>
+      </p:sp>
+    </p:spTree>
+  </p:cSld>
+  <p:clrMap bg1="lt1" tx1="dk1" bg2="lt2" tx2="dk2" accent1="accent1" accent2="accent2" accent3="accent3" accent4="accent4" accent5="accent5" accent6="accent6" hlink="hlink" folHlink="folHlink"/>
+  <p:notesStyle>
+    <a:lvl1pPr marL="0" algn="l" defTabSz="914400" rtl="0" eaLnBrk="1" latinLnBrk="0" hangingPunct="1">
+      <a:defRPr sz="1200" kern="1200">
+        <a:solidFill>
+          <a:schemeClr val="tx1"/>
+        </a:solidFill>
+        <a:latin typeface="+mn-lt"/>
+        <a:ea typeface="+mn-ea"/>
+        <a:cs typeface="+mn-cs"/>
+      </a:defRPr>
+    </a:lvl1pPr>
+    <a:lvl2pPr marL="457200" algn="l" defTabSz="914400" rtl="0" eaLnBrk="1" latinLnBrk="0" hangingPunct="1">
+      <a:defRPr sz="1200" kern="1200">
+        <a:solidFill>
+          <a:schemeClr val="tx1"/>
+        </a:solidFill>
+        <a:latin typeface="+mn-lt"/>
+        <a:ea typeface="+mn-ea"/>
+        <a:cs typeface="+mn-cs"/>
+      </a:defRPr>
+    </a:lvl2pPr>
+    <a:lvl3pPr marL="914400" algn="l" defTabSz="914400" rtl="0" eaLnBrk="1" latinLnBrk="0" hangingPunct="1">
+      <a:defRPr sz="1200" kern="1200">
+        <a:solidFill>
+          <a:schemeClr val="tx1"/>
+        </a:solidFill>
+        <a:latin typeface="+mn-lt"/>
+        <a:ea typeface="+mn-ea"/>
+        <a:cs typeface="+mn-cs"/>
+      </a:defRPr>
+    </a:lvl3pPr>
+    <a:lvl4pPr marL="1371600" algn="l" defTabSz="914400" rtl="0" eaLnBrk="1" latinLnBrk="0" hangingPunct="1">
+      <a:defRPr sz="1200" kern="1200">
+        <a:solidFill>
+          <a:schemeClr val="tx1"/>
+        </a:solidFill>
+        <a:latin typeface="+mn-lt"/>
+        <a:ea typeface="+mn-ea"/>
+        <a:cs typeface="+mn-cs"/>
+      </a:defRPr>
+    </a:lvl4pPr>
+    <a:lvl5pPr marL="1828800" algn="l" defTabSz="914400" rtl="0" eaLnBrk="1" latinLnBrk="0" hangingPunct="1">
+      <a:defRPr sz="1200" kern="1200">
+        <a:solidFill>
+          <a:schemeClr val="tx1"/>
+        </a:solidFill>
+        <a:latin typeface="+mn-lt"/>
+        <a:ea typeface="+mn-ea"/>
+        <a:cs typeface="+mn-cs"/>
+      </a:defRPr>
+    </a:lvl5pPr>
+    <a:lvl6pPr marL="2286000" algn="l" defTabSz="914400" rtl="0" eaLnBrk="1" latinLnBrk="0" hangingPunct="1">
+      <a:defRPr sz="1200" kern="1200">
+        <a:solidFill>
+          <a:schemeClr val="tx1"/>
+        </a:solidFill>
+        <a:latin typeface="+mn-lt"/>
+        <a:ea typeface="+mn-ea"/>
+        <a:cs typeface="+mn-cs"/>
+      </a:defRPr>
+    </a:lvl6pPr>
+    <a:lvl7pPr marL="2743200" algn="l" defTabSz="914400" rtl="0" eaLnBrk="1" latinLnBrk="0" hangingPunct="1">
+      <a:defRPr sz="1200" kern="1200">
+        <a:solidFill>
+          <a:schemeClr val="tx1"/>
+        </a:solidFill>
+        <a:latin typeface="+mn-lt"/>
+        <a:ea typeface="+mn-ea"/>
+        <a:cs typeface="+mn-cs"/>
+      </a:defRPr>
+    </a:lvl7pPr>
+    <a:lvl8pPr marL="3200400" algn="l" defTabSz="914400" rtl="0" eaLnBrk="1" latinLnBrk="0" hangingPunct="1">
+      <a:defRPr sz="1200" kern="1200">
+        <a:solidFill>
+          <a:schemeClr val="tx1"/>
+        </a:solidFill>
+        <a:latin typeface="+mn-lt"/>
+        <a:ea typeface="+mn-ea"/>
+        <a:cs typeface="+mn-cs"/>
+      </a:defRPr>
+    </a:lvl8pPr>
+    <a:lvl9pPr marL="3657600" algn="l" defTabSz="914400" rtl="0" eaLnBrk="1" latinLnBrk="0" hangingPunct="1">
+      <a:defRPr sz="1200" kern="1200">
+        <a:solidFill>
+          <a:schemeClr val="tx1"/>
+        </a:solidFill>
+        <a:latin typeface="+mn-lt"/>
+        <a:ea typeface="+mn-ea"/>
+        <a:cs typeface="+mn-cs"/>
+      </a:defRPr>
+    </a:lvl9pPr>
+  </p:notesStyle>
+</p:notesMaster>
+</file>
+
+<file path=ppt/notesSlides/notesSlide1.xml><?xml version="1.0" encoding="utf-8"?>
+<p:notes xmlns:a="http://schemas.openxmlformats.org/drawingml/2006/main" xmlns:r="http://schemas.openxmlformats.org/officeDocument/2006/relationships" xmlns:p="http://schemas.openxmlformats.org/presentationml/2006/main">
+  <p:cSld>
+    <p:spTree>
+      <p:nvGrpSpPr>
+        <p:cNvPr id="1" name=""/>
+        <p:cNvGrpSpPr/>
+        <p:nvPr/>
+      </p:nvGrpSpPr>
+      <p:grpSpPr>
+        <a:xfrm>
+          <a:off x="0" y="0"/>
+          <a:ext cx="0" cy="0"/>
+          <a:chOff x="0" y="0"/>
+          <a:chExt cx="0" cy="0"/>
+        </a:xfrm>
+      </p:grpSpPr>
+      <p:sp>
+        <p:nvSpPr>
+          <p:cNvPr id="2" name="Образ слайда 1"/>
+          <p:cNvSpPr>
+            <a:spLocks noGrp="1" noRot="1" noChangeAspect="1"/>
+          </p:cNvSpPr>
+          <p:nvPr>
+            <p:ph type="sldImg"/>
+          </p:nvPr>
+        </p:nvSpPr>
+        <p:spPr/>
+      </p:sp>
+      <p:sp>
+        <p:nvSpPr>
+          <p:cNvPr id="3" name="Заметки 2"/>
+          <p:cNvSpPr>
+            <a:spLocks noGrp="1"/>
+          </p:cNvSpPr>
+          <p:nvPr>
+            <p:ph type="body" idx="1"/>
+          </p:nvPr>
+        </p:nvSpPr>
+        <p:spPr/>
+        <p:txBody>
+          <a:bodyPr>
+            <a:normAutofit/>
+          </a:bodyPr>
+          <a:lstStyle/>
+          <a:p>
+            <a:endParaRPr lang="ru-RU"/>
+          </a:p>
+        </p:txBody>
+      </p:sp>
+      <p:sp>
+        <p:nvSpPr>
+          <p:cNvPr id="4" name="Номер слайда 3"/>
+          <p:cNvSpPr>
+            <a:spLocks noGrp="1"/>
+          </p:cNvSpPr>
+          <p:nvPr>
+            <p:ph type="sldNum" sz="quarter" idx="10"/>
+          </p:nvPr>
+        </p:nvSpPr>
+        <p:spPr/>
+        <p:txBody>
+          <a:bodyPr/>
+          <a:lstStyle/>
+          <a:p>
+            <a:fld id="{7B282D97-E781-498E-BB32-5DDF5A414349}" type="slidenum">
+              <a:rPr lang="ru-RU" smtClean="0"/>
+              <a:pPr/>
+              <a:t>1</a:t>
+            </a:fld>
+            <a:endParaRPr lang="ru-RU"/>
+          </a:p>
+        </p:txBody>
+      </p:sp>
+    </p:spTree>
+  </p:cSld>
+  <p:clrMapOvr>
+    <a:masterClrMapping/>
+  </p:clrMapOvr>
+</p:notes>
+</file>
+
 <file path=ppt/slideLayouts/slideLayout1.xml><?xml version="1.0" encoding="utf-8"?>
 <p:sldLayout xmlns:a="http://schemas.openxmlformats.org/drawingml/2006/main" xmlns:r="http://schemas.openxmlformats.org/officeDocument/2006/relationships" xmlns:p="http://schemas.openxmlformats.org/presentationml/2006/main" type="title" preserve="1">
   <p:cSld name="Титульный слайд">
@@ -310,9 +740,10 @@
           <a:bodyPr/>
           <a:lstStyle/>
           <a:p>
-            <a:fld id="{AD147868-ACCB-49B6-9AD5-0E927A4E5BCE}" type="datetimeFigureOut">
-              <a:rPr lang="ru-RU" smtClean="0"/>
-              <a:t>30.05.2013</a:t>
+            <a:fld id="{ED078997-DAFF-4C23-A6B6-00421BFA8725}" type="datetime1">
+              <a:rPr lang="ru-RU" smtClean="0"/>
+              <a:pPr/>
+              <a:t>09.06.2013</a:t>
             </a:fld>
             <a:endParaRPr lang="ru-RU"/>
           </a:p>
@@ -354,6 +785,7 @@
           <a:p>
             <a:fld id="{9A39E707-F3CE-4BEB-9583-BB36F29193FA}" type="slidenum">
               <a:rPr lang="ru-RU" smtClean="0"/>
+              <a:pPr/>
               <a:t>‹#›</a:t>
             </a:fld>
             <a:endParaRPr lang="ru-RU"/>
@@ -475,9 +907,10 @@
           <a:bodyPr/>
           <a:lstStyle/>
           <a:p>
-            <a:fld id="{AD147868-ACCB-49B6-9AD5-0E927A4E5BCE}" type="datetimeFigureOut">
-              <a:rPr lang="ru-RU" smtClean="0"/>
-              <a:t>31.05.2013</a:t>
+            <a:fld id="{5C178956-C440-4961-8521-990435B25F79}" type="datetime1">
+              <a:rPr lang="ru-RU" smtClean="0"/>
+              <a:pPr/>
+              <a:t>09.06.2013</a:t>
             </a:fld>
             <a:endParaRPr lang="ru-RU"/>
           </a:p>
@@ -519,6 +952,7 @@
           <a:p>
             <a:fld id="{9A39E707-F3CE-4BEB-9583-BB36F29193FA}" type="slidenum">
               <a:rPr lang="ru-RU" smtClean="0"/>
+              <a:pPr/>
               <a:t>‹#›</a:t>
             </a:fld>
             <a:endParaRPr lang="ru-RU"/>
@@ -650,9 +1084,10 @@
           <a:bodyPr/>
           <a:lstStyle/>
           <a:p>
-            <a:fld id="{AD147868-ACCB-49B6-9AD5-0E927A4E5BCE}" type="datetimeFigureOut">
-              <a:rPr lang="ru-RU" smtClean="0"/>
-              <a:t>31.05.2013</a:t>
+            <a:fld id="{9AF26269-AF32-4694-ADA3-B45B035C2E55}" type="datetime1">
+              <a:rPr lang="ru-RU" smtClean="0"/>
+              <a:pPr/>
+              <a:t>09.06.2013</a:t>
             </a:fld>
             <a:endParaRPr lang="ru-RU"/>
           </a:p>
@@ -694,6 +1129,7 @@
           <a:p>
             <a:fld id="{9A39E707-F3CE-4BEB-9583-BB36F29193FA}" type="slidenum">
               <a:rPr lang="ru-RU" smtClean="0"/>
+              <a:pPr/>
               <a:t>‹#›</a:t>
             </a:fld>
             <a:endParaRPr lang="ru-RU"/>
@@ -815,9 +1251,10 @@
           <a:bodyPr/>
           <a:lstStyle/>
           <a:p>
-            <a:fld id="{AD147868-ACCB-49B6-9AD5-0E927A4E5BCE}" type="datetimeFigureOut">
-              <a:rPr lang="ru-RU" smtClean="0"/>
-              <a:t>30.05.2013</a:t>
+            <a:fld id="{C20E3EC9-C9C3-4C9E-803D-4FC15CF7057D}" type="datetime1">
+              <a:rPr lang="ru-RU" smtClean="0"/>
+              <a:pPr/>
+              <a:t>09.06.2013</a:t>
             </a:fld>
             <a:endParaRPr lang="ru-RU"/>
           </a:p>
@@ -859,6 +1296,7 @@
           <a:p>
             <a:fld id="{9A39E707-F3CE-4BEB-9583-BB36F29193FA}" type="slidenum">
               <a:rPr lang="ru-RU" smtClean="0"/>
+              <a:pPr/>
               <a:t>‹#›</a:t>
             </a:fld>
             <a:endParaRPr lang="ru-RU"/>
@@ -1056,9 +1494,10 @@
           <a:bodyPr/>
           <a:lstStyle/>
           <a:p>
-            <a:fld id="{AD147868-ACCB-49B6-9AD5-0E927A4E5BCE}" type="datetimeFigureOut">
-              <a:rPr lang="ru-RU" smtClean="0"/>
-              <a:t>31.05.2013</a:t>
+            <a:fld id="{C70DA1FB-3B8B-415C-9FB6-BFB041B1D408}" type="datetime1">
+              <a:rPr lang="ru-RU" smtClean="0"/>
+              <a:pPr/>
+              <a:t>09.06.2013</a:t>
             </a:fld>
             <a:endParaRPr lang="ru-RU"/>
           </a:p>
@@ -1100,6 +1539,7 @@
           <a:p>
             <a:fld id="{9A39E707-F3CE-4BEB-9583-BB36F29193FA}" type="slidenum">
               <a:rPr lang="ru-RU" smtClean="0"/>
+              <a:pPr/>
               <a:t>‹#›</a:t>
             </a:fld>
             <a:endParaRPr lang="ru-RU"/>
@@ -1339,9 +1779,10 @@
           <a:bodyPr/>
           <a:lstStyle/>
           <a:p>
-            <a:fld id="{AD147868-ACCB-49B6-9AD5-0E927A4E5BCE}" type="datetimeFigureOut">
-              <a:rPr lang="ru-RU" smtClean="0"/>
-              <a:t>31.05.2013</a:t>
+            <a:fld id="{4AF34C8B-8DA2-4E70-9D9F-371CBE008629}" type="datetime1">
+              <a:rPr lang="ru-RU" smtClean="0"/>
+              <a:pPr/>
+              <a:t>09.06.2013</a:t>
             </a:fld>
             <a:endParaRPr lang="ru-RU"/>
           </a:p>
@@ -1383,6 +1824,7 @@
           <a:p>
             <a:fld id="{9A39E707-F3CE-4BEB-9583-BB36F29193FA}" type="slidenum">
               <a:rPr lang="ru-RU" smtClean="0"/>
+              <a:pPr/>
               <a:t>‹#›</a:t>
             </a:fld>
             <a:endParaRPr lang="ru-RU"/>
@@ -1756,9 +2198,10 @@
           <a:bodyPr/>
           <a:lstStyle/>
           <a:p>
-            <a:fld id="{AD147868-ACCB-49B6-9AD5-0E927A4E5BCE}" type="datetimeFigureOut">
-              <a:rPr lang="ru-RU" smtClean="0"/>
-              <a:t>31.05.2013</a:t>
+            <a:fld id="{E76A68D0-D777-4745-85C4-114F45582716}" type="datetime1">
+              <a:rPr lang="ru-RU" smtClean="0"/>
+              <a:pPr/>
+              <a:t>09.06.2013</a:t>
             </a:fld>
             <a:endParaRPr lang="ru-RU"/>
           </a:p>
@@ -1800,6 +2243,7 @@
           <a:p>
             <a:fld id="{9A39E707-F3CE-4BEB-9583-BB36F29193FA}" type="slidenum">
               <a:rPr lang="ru-RU" smtClean="0"/>
+              <a:pPr/>
               <a:t>‹#›</a:t>
             </a:fld>
             <a:endParaRPr lang="ru-RU"/>
@@ -1869,9 +2313,10 @@
           <a:bodyPr/>
           <a:lstStyle/>
           <a:p>
-            <a:fld id="{AD147868-ACCB-49B6-9AD5-0E927A4E5BCE}" type="datetimeFigureOut">
-              <a:rPr lang="ru-RU" smtClean="0"/>
-              <a:t>31.05.2013</a:t>
+            <a:fld id="{F60E29F0-D0BA-47F9-8F50-2CC94894CC5E}" type="datetime1">
+              <a:rPr lang="ru-RU" smtClean="0"/>
+              <a:pPr/>
+              <a:t>09.06.2013</a:t>
             </a:fld>
             <a:endParaRPr lang="ru-RU"/>
           </a:p>
@@ -1913,6 +2358,7 @@
           <a:p>
             <a:fld id="{9A39E707-F3CE-4BEB-9583-BB36F29193FA}" type="slidenum">
               <a:rPr lang="ru-RU" smtClean="0"/>
+              <a:pPr/>
               <a:t>‹#›</a:t>
             </a:fld>
             <a:endParaRPr lang="ru-RU"/>
@@ -1959,9 +2405,10 @@
           <a:bodyPr/>
           <a:lstStyle/>
           <a:p>
-            <a:fld id="{AD147868-ACCB-49B6-9AD5-0E927A4E5BCE}" type="datetimeFigureOut">
-              <a:rPr lang="ru-RU" smtClean="0"/>
-              <a:t>31.05.2013</a:t>
+            <a:fld id="{B5365CE0-89AC-4278-858F-704B1C3BE8D1}" type="datetime1">
+              <a:rPr lang="ru-RU" smtClean="0"/>
+              <a:pPr/>
+              <a:t>09.06.2013</a:t>
             </a:fld>
             <a:endParaRPr lang="ru-RU"/>
           </a:p>
@@ -2003,6 +2450,7 @@
           <a:p>
             <a:fld id="{9A39E707-F3CE-4BEB-9583-BB36F29193FA}" type="slidenum">
               <a:rPr lang="ru-RU" smtClean="0"/>
+              <a:pPr/>
               <a:t>‹#›</a:t>
             </a:fld>
             <a:endParaRPr lang="ru-RU"/>
@@ -2231,9 +2679,10 @@
           <a:bodyPr/>
           <a:lstStyle/>
           <a:p>
-            <a:fld id="{AD147868-ACCB-49B6-9AD5-0E927A4E5BCE}" type="datetimeFigureOut">
-              <a:rPr lang="ru-RU" smtClean="0"/>
-              <a:t>31.05.2013</a:t>
+            <a:fld id="{04B7F107-8DD4-4E4B-B747-A12893D95654}" type="datetime1">
+              <a:rPr lang="ru-RU" smtClean="0"/>
+              <a:pPr/>
+              <a:t>09.06.2013</a:t>
             </a:fld>
             <a:endParaRPr lang="ru-RU"/>
           </a:p>
@@ -2275,6 +2724,7 @@
           <a:p>
             <a:fld id="{9A39E707-F3CE-4BEB-9583-BB36F29193FA}" type="slidenum">
               <a:rPr lang="ru-RU" smtClean="0"/>
+              <a:pPr/>
               <a:t>‹#›</a:t>
             </a:fld>
             <a:endParaRPr lang="ru-RU"/>
@@ -2479,9 +2929,10 @@
           <a:bodyPr/>
           <a:lstStyle/>
           <a:p>
-            <a:fld id="{AD147868-ACCB-49B6-9AD5-0E927A4E5BCE}" type="datetimeFigureOut">
-              <a:rPr lang="ru-RU" smtClean="0"/>
-              <a:t>31.05.2013</a:t>
+            <a:fld id="{62D83752-F1D1-47AE-99A8-9F7A50D6BD52}" type="datetime1">
+              <a:rPr lang="ru-RU" smtClean="0"/>
+              <a:pPr/>
+              <a:t>09.06.2013</a:t>
             </a:fld>
             <a:endParaRPr lang="ru-RU"/>
           </a:p>
@@ -2523,6 +2974,7 @@
           <a:p>
             <a:fld id="{9A39E707-F3CE-4BEB-9583-BB36F29193FA}" type="slidenum">
               <a:rPr lang="ru-RU" smtClean="0"/>
+              <a:pPr/>
               <a:t>‹#›</a:t>
             </a:fld>
             <a:endParaRPr lang="ru-RU"/>
@@ -2687,9 +3139,10 @@
             </a:lvl1pPr>
           </a:lstStyle>
           <a:p>
-            <a:fld id="{AD147868-ACCB-49B6-9AD5-0E927A4E5BCE}" type="datetimeFigureOut">
-              <a:rPr lang="ru-RU" smtClean="0"/>
-              <a:t>30.05.2013</a:t>
+            <a:fld id="{F99728D3-7560-476D-B1BE-EADDDE057D42}" type="datetime1">
+              <a:rPr lang="ru-RU" smtClean="0"/>
+              <a:pPr/>
+              <a:t>09.06.2013</a:t>
             </a:fld>
             <a:endParaRPr lang="ru-RU"/>
           </a:p>
@@ -2767,6 +3220,7 @@
           <a:p>
             <a:fld id="{9A39E707-F3CE-4BEB-9583-BB36F29193FA}" type="slidenum">
               <a:rPr lang="ru-RU" smtClean="0"/>
+              <a:pPr/>
               <a:t>‹#›</a:t>
             </a:fld>
             <a:endParaRPr lang="ru-RU"/>
@@ -2789,6 +3243,7 @@
     <p:sldLayoutId id="2147483658" r:id="rId10"/>
     <p:sldLayoutId id="2147483659" r:id="rId11"/>
   </p:sldLayoutIdLst>
+  <p:hf hdr="0" ftr="0" dt="0"/>
   <p:txStyles>
     <p:titleStyle>
       <a:lvl1pPr algn="ctr" defTabSz="914400" rtl="0" eaLnBrk="1" latinLnBrk="0" hangingPunct="1">
@@ -3082,17 +3537,6 @@
           <a:lstStyle/>
           <a:p>
             <a:r>
-              <a:rPr lang="ru-RU" sz="3600" dirty="0" smtClean="0"/>
-              <a:t>Дипломная работа по направлению «Прикладная математика и информатика» на тему</a:t>
-            </a:r>
-            <a:r>
-              <a:rPr lang="ru-RU" dirty="0" smtClean="0"/>
-              <a:t/>
-            </a:r>
-            <a:br>
-              <a:rPr lang="ru-RU" dirty="0" smtClean="0"/>
-            </a:br>
-            <a:r>
               <a:rPr lang="ru-RU" sz="5400" b="1" i="1" dirty="0" smtClean="0"/>
               <a:t>Визуализация в </a:t>
             </a:r>
@@ -3122,16 +3566,8 @@
             <a:pPr algn="r"/>
             <a:r>
               <a:rPr lang="ru-RU" dirty="0" smtClean="0"/>
-              <a:t>Автор: Грибова М.А.</a:t>
-            </a:r>
-          </a:p>
-          <a:p>
-            <a:pPr algn="r"/>
-            <a:r>
-              <a:rPr lang="ru-RU" dirty="0" smtClean="0"/>
-              <a:t>Руководитель: Доцент кафедры МОЭВМ, Кринкин К.В.</a:t>
-            </a:r>
-            <a:endParaRPr lang="ru-RU" dirty="0"/>
+              <a:t>Грибова М.А., 9381</a:t>
+            </a:r>
           </a:p>
         </p:txBody>
       </p:sp>
@@ -3357,6 +3793,30 @@
           </a:p>
         </p:txBody>
       </p:sp>
+      <p:sp>
+        <p:nvSpPr>
+          <p:cNvPr id="4" name="Номер слайда 3"/>
+          <p:cNvSpPr>
+            <a:spLocks noGrp="1"/>
+          </p:cNvSpPr>
+          <p:nvPr>
+            <p:ph type="sldNum" sz="quarter" idx="12"/>
+          </p:nvPr>
+        </p:nvSpPr>
+        <p:spPr/>
+        <p:txBody>
+          <a:bodyPr/>
+          <a:lstStyle/>
+          <a:p>
+            <a:fld id="{9A39E707-F3CE-4BEB-9583-BB36F29193FA}" type="slidenum">
+              <a:rPr lang="ru-RU" smtClean="0"/>
+              <a:pPr/>
+              <a:t>10</a:t>
+            </a:fld>
+            <a:endParaRPr lang="ru-RU"/>
+          </a:p>
+        </p:txBody>
+      </p:sp>
     </p:spTree>
   </p:cSld>
   <p:clrMapOvr>
@@ -3406,11 +3866,7 @@
           <a:p>
             <a:r>
               <a:rPr lang="en-US" dirty="0" smtClean="0"/>
-              <a:t>Indoor-</a:t>
-            </a:r>
-            <a:r>
-              <a:rPr lang="ru-RU" dirty="0" smtClean="0"/>
-              <a:t>сервисы</a:t>
+              <a:t>Geo2tag</a:t>
             </a:r>
             <a:endParaRPr lang="ru-RU" dirty="0"/>
           </a:p>
@@ -3426,89 +3882,115 @@
             <p:ph idx="1"/>
           </p:nvPr>
         </p:nvSpPr>
-        <p:spPr/>
+        <p:spPr>
+          <a:xfrm>
+            <a:off x="428596" y="1214422"/>
+            <a:ext cx="8229600" cy="5214974"/>
+          </a:xfrm>
+        </p:spPr>
         <p:txBody>
           <a:bodyPr>
-            <a:normAutofit/>
+            <a:noAutofit/>
           </a:bodyPr>
           <a:lstStyle/>
-          <a:p>
-            <a:pPr fontAlgn="base"/>
-            <a:r>
-              <a:rPr lang="ru-RU" dirty="0"/>
-              <a:t>Приложения для аэропортов и транспортных </a:t>
-            </a:r>
-            <a:r>
-              <a:rPr lang="ru-RU" dirty="0" err="1"/>
-              <a:t>хабов</a:t>
-            </a:r>
-            <a:r>
-              <a:rPr lang="ru-RU" dirty="0"/>
-              <a:t>.</a:t>
-            </a:r>
-            <a:endParaRPr lang="ru-RU" b="1" dirty="0"/>
-          </a:p>
-          <a:p>
-            <a:r>
-              <a:rPr lang="ru-RU" dirty="0" smtClean="0"/>
-              <a:t>Приложения </a:t>
-            </a:r>
-            <a:r>
-              <a:rPr lang="ru-RU" dirty="0"/>
-              <a:t>для торговых центров</a:t>
-            </a:r>
-            <a:r>
-              <a:rPr lang="ru-RU" dirty="0" smtClean="0"/>
-              <a:t>.</a:t>
-            </a:r>
-            <a:endParaRPr lang="ru-RU" dirty="0"/>
-          </a:p>
-          <a:p>
-            <a:r>
-              <a:rPr lang="en-US" dirty="0"/>
-              <a:t>Check</a:t>
-            </a:r>
-            <a:r>
-              <a:rPr lang="ru-RU" dirty="0"/>
-              <a:t>-</a:t>
-            </a:r>
-            <a:r>
-              <a:rPr lang="en-US" dirty="0"/>
-              <a:t>In</a:t>
-            </a:r>
-            <a:r>
-              <a:rPr lang="ru-RU" dirty="0"/>
-              <a:t> приложения</a:t>
-            </a:r>
-            <a:r>
-              <a:rPr lang="ru-RU" dirty="0" smtClean="0"/>
-              <a:t>.</a:t>
-            </a:r>
-            <a:endParaRPr lang="ru-RU" dirty="0"/>
-          </a:p>
-          <a:p>
-            <a:pPr fontAlgn="base"/>
-            <a:r>
-              <a:rPr lang="ru-RU" dirty="0" smtClean="0"/>
-              <a:t>И многое другое</a:t>
-            </a:r>
-            <a:endParaRPr lang="ru-RU" b="1" dirty="0"/>
-          </a:p>
           <a:p>
             <a:pPr>
               <a:buNone/>
             </a:pPr>
             <a:r>
-              <a:rPr lang="ru-RU" dirty="0"/>
-              <a:t/>
-            </a:r>
-            <a:br>
-              <a:rPr lang="ru-RU" dirty="0"/>
-            </a:br>
-            <a:endParaRPr lang="ru-RU" dirty="0"/>
-          </a:p>
-          <a:p>
-            <a:endParaRPr lang="ru-RU" dirty="0"/>
+              <a:rPr lang="ru-RU" sz="2400" dirty="0" smtClean="0"/>
+              <a:t>Открытая программная платформа </a:t>
+            </a:r>
+            <a:r>
+              <a:rPr lang="ru-RU" sz="2400" dirty="0"/>
+              <a:t>для построения </a:t>
+            </a:r>
+            <a:r>
+              <a:rPr lang="ru-RU" sz="2400" dirty="0" smtClean="0"/>
+              <a:t>сервисов, основанных </a:t>
+            </a:r>
+            <a:r>
+              <a:rPr lang="ru-RU" sz="2400" dirty="0"/>
+              <a:t>на местоположении. Платформа предоставляет все необходимые программные интерфейсы, структуры данных, запросы и фильтры, которые требуются для создания базовой функциональности сервисов, использующих местоположение. </a:t>
+            </a:r>
+            <a:endParaRPr lang="ru-RU" sz="2400" dirty="0" smtClean="0"/>
+          </a:p>
+          <a:p>
+            <a:pPr>
+              <a:buNone/>
+            </a:pPr>
+            <a:r>
+              <a:rPr lang="ru-RU" sz="2400" b="1" dirty="0" smtClean="0"/>
+              <a:t>Основные возможности:</a:t>
+            </a:r>
+            <a:endParaRPr lang="ru-RU" sz="2400" b="1" dirty="0"/>
+          </a:p>
+          <a:p>
+            <a:pPr lvl="0"/>
+            <a:r>
+              <a:rPr lang="ru-RU" sz="2400" dirty="0"/>
+              <a:t>предоставление хранилища для </a:t>
+            </a:r>
+            <a:r>
+              <a:rPr lang="ru-RU" sz="2400" dirty="0" err="1"/>
+              <a:t>геотегов</a:t>
+            </a:r>
+            <a:r>
+              <a:rPr lang="ru-RU" sz="2400" dirty="0"/>
+              <a:t>;</a:t>
+            </a:r>
+          </a:p>
+          <a:p>
+            <a:pPr lvl="0"/>
+            <a:r>
+              <a:rPr lang="ru-RU" sz="2400" dirty="0"/>
+              <a:t>выполнение 2D/3D пространственно-временных запросов;</a:t>
+            </a:r>
+          </a:p>
+          <a:p>
+            <a:pPr lvl="0"/>
+            <a:r>
+              <a:rPr lang="ru-RU" sz="2400" dirty="0"/>
+              <a:t>классификация тегов (по пользователям, по тематике,...);</a:t>
+            </a:r>
+          </a:p>
+          <a:p>
+            <a:pPr lvl="0"/>
+            <a:r>
+              <a:rPr lang="ru-RU" sz="2400" dirty="0" err="1"/>
+              <a:t>RESTfull</a:t>
+            </a:r>
+            <a:r>
+              <a:rPr lang="ru-RU" sz="2400" dirty="0"/>
+              <a:t> API для доступа к данным</a:t>
+            </a:r>
+          </a:p>
+          <a:p>
+            <a:endParaRPr lang="ru-RU" sz="2400" dirty="0"/>
+          </a:p>
+        </p:txBody>
+      </p:sp>
+      <p:sp>
+        <p:nvSpPr>
+          <p:cNvPr id="4" name="Номер слайда 3"/>
+          <p:cNvSpPr>
+            <a:spLocks noGrp="1"/>
+          </p:cNvSpPr>
+          <p:nvPr>
+            <p:ph type="sldNum" sz="quarter" idx="12"/>
+          </p:nvPr>
+        </p:nvSpPr>
+        <p:spPr/>
+        <p:txBody>
+          <a:bodyPr/>
+          <a:lstStyle/>
+          <a:p>
+            <a:fld id="{9A39E707-F3CE-4BEB-9583-BB36F29193FA}" type="slidenum">
+              <a:rPr lang="ru-RU" smtClean="0"/>
+              <a:pPr/>
+              <a:t>11</a:t>
+            </a:fld>
+            <a:endParaRPr lang="ru-RU"/>
           </a:p>
         </p:txBody>
       </p:sp>
@@ -3560,6 +4042,10 @@
           <a:lstStyle/>
           <a:p>
             <a:r>
+              <a:rPr lang="ru-RU" dirty="0" smtClean="0"/>
+              <a:t>Аналоги </a:t>
+            </a:r>
+            <a:r>
               <a:rPr lang="en-US" dirty="0" smtClean="0"/>
               <a:t>Geo2tag</a:t>
             </a:r>
@@ -3577,91 +4063,132 @@
             <p:ph idx="1"/>
           </p:nvPr>
         </p:nvSpPr>
-        <p:spPr>
-          <a:xfrm>
-            <a:off x="428596" y="1214422"/>
-            <a:ext cx="8229600" cy="5214974"/>
-          </a:xfrm>
-        </p:spPr>
+        <p:spPr/>
         <p:txBody>
           <a:bodyPr>
-            <a:noAutofit/>
+            <a:normAutofit/>
           </a:bodyPr>
           <a:lstStyle/>
           <a:p>
-            <a:pPr>
-              <a:buNone/>
-            </a:pPr>
-            <a:r>
-              <a:rPr lang="ru-RU" sz="2400" dirty="0" smtClean="0"/>
-              <a:t>Открытая программная платформа </a:t>
-            </a:r>
-            <a:r>
-              <a:rPr lang="ru-RU" sz="2400" dirty="0"/>
-              <a:t>для построения </a:t>
-            </a:r>
-            <a:r>
-              <a:rPr lang="ru-RU" sz="2400" dirty="0" smtClean="0"/>
-              <a:t>сервисов, основанных </a:t>
-            </a:r>
-            <a:r>
-              <a:rPr lang="ru-RU" sz="2400" dirty="0"/>
-              <a:t>на местоположении. Платформа предоставляет все необходимые программные интерфейсы, структуры данных, запросы и фильтры, которые требуются для создания базовой функциональности сервисов, использующих местоположение. </a:t>
-            </a:r>
-            <a:endParaRPr lang="ru-RU" sz="2400" dirty="0" smtClean="0"/>
-          </a:p>
-          <a:p>
-            <a:pPr>
-              <a:buNone/>
-            </a:pPr>
-            <a:r>
-              <a:rPr lang="ru-RU" sz="2400" b="1" dirty="0" smtClean="0"/>
-              <a:t>Основные возможности:</a:t>
-            </a:r>
-            <a:endParaRPr lang="ru-RU" sz="2400" b="1" dirty="0"/>
+            <a:r>
+              <a:rPr lang="ru-RU" dirty="0"/>
+              <a:t>Идея создания программной платформы для разработки сервисов использующих </a:t>
+            </a:r>
+            <a:r>
+              <a:rPr lang="ru-RU" dirty="0" err="1"/>
+              <a:t>геоинформацию</a:t>
+            </a:r>
+            <a:r>
+              <a:rPr lang="ru-RU" dirty="0"/>
+              <a:t> не нова. Однако, </a:t>
+            </a:r>
+            <a:r>
+              <a:rPr lang="ru-RU" b="1" dirty="0"/>
+              <a:t>Geo2tag LBS </a:t>
+            </a:r>
+            <a:r>
+              <a:rPr lang="ru-RU" b="1" dirty="0" err="1"/>
+              <a:t>Platform</a:t>
+            </a:r>
+            <a:r>
+              <a:rPr lang="ru-RU" dirty="0"/>
+              <a:t>, фактически является </a:t>
+            </a:r>
+            <a:r>
+              <a:rPr lang="ru-RU" dirty="0" err="1"/>
+              <a:t>превой</a:t>
+            </a:r>
+            <a:r>
+              <a:rPr lang="ru-RU" dirty="0"/>
+              <a:t> полностью открытой платформой такого рода</a:t>
+            </a:r>
+            <a:r>
+              <a:rPr lang="ru-RU" dirty="0" smtClean="0"/>
+              <a:t>.</a:t>
+            </a:r>
           </a:p>
           <a:p>
             <a:pPr lvl="0"/>
             <a:r>
-              <a:rPr lang="ru-RU" sz="2400" dirty="0"/>
-              <a:t>предоставление хранилища для </a:t>
-            </a:r>
-            <a:r>
-              <a:rPr lang="ru-RU" sz="2400" dirty="0" err="1"/>
-              <a:t>геотегов</a:t>
-            </a:r>
-            <a:r>
-              <a:rPr lang="ru-RU" sz="2400" dirty="0"/>
-              <a:t>;</a:t>
-            </a:r>
-          </a:p>
-          <a:p>
-            <a:pPr lvl="0"/>
-            <a:r>
-              <a:rPr lang="ru-RU" sz="2400" dirty="0"/>
-              <a:t>выполнение 2D/3D пространственно-временных запросов;</a:t>
-            </a:r>
-          </a:p>
-          <a:p>
-            <a:pPr lvl="0"/>
-            <a:r>
-              <a:rPr lang="ru-RU" sz="2400" dirty="0"/>
-              <a:t>классификация тегов (по пользователям, по тематике,...);</a:t>
-            </a:r>
-          </a:p>
-          <a:p>
-            <a:pPr lvl="0"/>
-            <a:r>
-              <a:rPr lang="ru-RU" sz="2400" dirty="0" err="1"/>
-              <a:t>RESTfull</a:t>
-            </a:r>
-            <a:r>
-              <a:rPr lang="ru-RU" sz="2400" dirty="0"/>
-              <a:t> API для доступа к данным</a:t>
-            </a:r>
-          </a:p>
-          <a:p>
-            <a:endParaRPr lang="ru-RU" sz="2400" dirty="0"/>
+              <a:rPr lang="ru-RU" dirty="0" smtClean="0"/>
+              <a:t>Известные </a:t>
+            </a:r>
+            <a:r>
+              <a:rPr lang="en-US" dirty="0" smtClean="0"/>
+              <a:t>LBS-</a:t>
+            </a:r>
+            <a:r>
+              <a:rPr lang="ru-RU" dirty="0" smtClean="0"/>
+              <a:t>сервисы: </a:t>
+            </a:r>
+            <a:r>
+              <a:rPr lang="ru-RU" dirty="0" err="1"/>
+              <a:t>Google</a:t>
+            </a:r>
+            <a:r>
+              <a:rPr lang="ru-RU" dirty="0"/>
+              <a:t> </a:t>
+            </a:r>
+            <a:r>
+              <a:rPr lang="ru-RU" dirty="0" err="1" smtClean="0"/>
+              <a:t>Latitude</a:t>
+            </a:r>
+            <a:r>
+              <a:rPr lang="ru-RU" dirty="0" smtClean="0"/>
+              <a:t>, </a:t>
+            </a:r>
+            <a:r>
+              <a:rPr lang="ru-RU" dirty="0" err="1" smtClean="0"/>
+              <a:t>AlterGeo</a:t>
+            </a:r>
+            <a:r>
+              <a:rPr lang="ru-RU" dirty="0" smtClean="0"/>
+              <a:t>, </a:t>
+            </a:r>
+            <a:r>
+              <a:rPr lang="ru-RU" dirty="0" err="1" smtClean="0"/>
+              <a:t>BluePont</a:t>
+            </a:r>
+            <a:r>
+              <a:rPr lang="ru-RU" dirty="0" smtClean="0"/>
+              <a:t>, </a:t>
+            </a:r>
+            <a:r>
+              <a:rPr lang="ru-RU" dirty="0" err="1" smtClean="0"/>
+              <a:t>Foursquare</a:t>
+            </a:r>
+            <a:r>
+              <a:rPr lang="ru-RU" dirty="0" smtClean="0"/>
+              <a:t> и т.д.</a:t>
+            </a:r>
+            <a:endParaRPr lang="ru-RU" dirty="0"/>
+          </a:p>
+          <a:p>
+            <a:endParaRPr lang="ru-RU" dirty="0"/>
+          </a:p>
+        </p:txBody>
+      </p:sp>
+      <p:sp>
+        <p:nvSpPr>
+          <p:cNvPr id="4" name="Номер слайда 3"/>
+          <p:cNvSpPr>
+            <a:spLocks noGrp="1"/>
+          </p:cNvSpPr>
+          <p:nvPr>
+            <p:ph type="sldNum" sz="quarter" idx="12"/>
+          </p:nvPr>
+        </p:nvSpPr>
+        <p:spPr/>
+        <p:txBody>
+          <a:bodyPr/>
+          <a:lstStyle/>
+          <a:p>
+            <a:fld id="{9A39E707-F3CE-4BEB-9583-BB36F29193FA}" type="slidenum">
+              <a:rPr lang="ru-RU" smtClean="0"/>
+              <a:pPr/>
+              <a:t>12</a:t>
+            </a:fld>
+            <a:endParaRPr lang="ru-RU"/>
           </a:p>
         </p:txBody>
       </p:sp>
@@ -3709,133 +4236,116 @@
         </p:nvSpPr>
         <p:spPr/>
         <p:txBody>
-          <a:bodyPr/>
+          <a:bodyPr>
+            <a:normAutofit fontScale="90000"/>
+          </a:bodyPr>
           <a:lstStyle/>
           <a:p>
             <a:r>
               <a:rPr lang="ru-RU" dirty="0" smtClean="0"/>
-              <a:t>Аналоги </a:t>
+              <a:t>Аналоги разрабатываемого приложения</a:t>
+            </a:r>
+            <a:endParaRPr lang="ru-RU" dirty="0"/>
+          </a:p>
+        </p:txBody>
+      </p:sp>
+      <p:sp>
+        <p:nvSpPr>
+          <p:cNvPr id="3" name="Содержимое 2"/>
+          <p:cNvSpPr>
+            <a:spLocks noGrp="1"/>
+          </p:cNvSpPr>
+          <p:nvPr>
+            <p:ph idx="1"/>
+          </p:nvPr>
+        </p:nvSpPr>
+        <p:spPr/>
+        <p:txBody>
+          <a:bodyPr/>
+          <a:lstStyle/>
+          <a:p>
+            <a:r>
+              <a:rPr lang="en-US" dirty="0" err="1" smtClean="0"/>
+              <a:t>Layar</a:t>
             </a:r>
             <a:r>
               <a:rPr lang="en-US" dirty="0" smtClean="0"/>
-              <a:t>Geo2tag</a:t>
+              <a:t> </a:t>
+            </a:r>
+            <a:r>
+              <a:rPr lang="en-US" dirty="0"/>
+              <a:t>Reality Browser</a:t>
+            </a:r>
+            <a:r>
+              <a:rPr lang="ru-RU" dirty="0"/>
+              <a:t>.</a:t>
+            </a:r>
+          </a:p>
+          <a:p>
+            <a:r>
+              <a:rPr lang="en-US" dirty="0" err="1" smtClean="0"/>
+              <a:t>WikiTude</a:t>
+            </a:r>
+            <a:r>
+              <a:rPr lang="en-US" dirty="0" smtClean="0"/>
+              <a:t> </a:t>
+            </a:r>
+            <a:r>
+              <a:rPr lang="en-US" dirty="0"/>
+              <a:t>Drive.</a:t>
             </a:r>
             <a:endParaRPr lang="ru-RU" dirty="0"/>
           </a:p>
-        </p:txBody>
-      </p:sp>
-      <p:sp>
-        <p:nvSpPr>
-          <p:cNvPr id="3" name="Содержимое 2"/>
-          <p:cNvSpPr>
-            <a:spLocks noGrp="1"/>
-          </p:cNvSpPr>
-          <p:nvPr>
-            <p:ph idx="1"/>
-          </p:nvPr>
-        </p:nvSpPr>
-        <p:spPr/>
-        <p:txBody>
-          <a:bodyPr>
-            <a:normAutofit/>
-          </a:bodyPr>
-          <a:lstStyle/>
-          <a:p>
+          <a:p>
+            <a:r>
+              <a:rPr lang="en-US" dirty="0" err="1" smtClean="0"/>
+              <a:t>TagWhat</a:t>
+            </a:r>
             <a:r>
               <a:rPr lang="ru-RU" dirty="0"/>
-              <a:t>Идея создания программной платформы для разработки сервисов использующих </a:t>
-            </a:r>
-            <a:r>
-              <a:rPr lang="ru-RU" dirty="0" err="1"/>
-              <a:t>геоинформацию</a:t>
+              <a:t>.</a:t>
+            </a:r>
+          </a:p>
+          <a:p>
+            <a:r>
+              <a:rPr lang="en-US" dirty="0" err="1" smtClean="0"/>
+              <a:t>Augement</a:t>
             </a:r>
             <a:r>
               <a:rPr lang="ru-RU" dirty="0"/>
-              <a:t> не нова. Однако, </a:t>
-            </a:r>
-            <a:r>
-              <a:rPr lang="ru-RU" b="1" dirty="0"/>
-              <a:t>Geo2tag LBS </a:t>
-            </a:r>
-            <a:r>
-              <a:rPr lang="ru-RU" b="1" dirty="0" err="1"/>
-              <a:t>Platform</a:t>
-            </a:r>
-            <a:r>
-              <a:rPr lang="ru-RU" dirty="0"/>
-              <a:t>, фактически является </a:t>
-            </a:r>
-            <a:r>
-              <a:rPr lang="ru-RU" dirty="0" err="1"/>
-              <a:t>превой</a:t>
-            </a:r>
-            <a:r>
-              <a:rPr lang="ru-RU" dirty="0"/>
-              <a:t> полностью открытой платформой такого рода</a:t>
-            </a:r>
-            <a:r>
-              <a:rPr lang="ru-RU" dirty="0" smtClean="0"/>
               <a:t>.</a:t>
             </a:r>
           </a:p>
           <a:p>
-            <a:pPr lvl="0"/>
-            <a:r>
-              <a:rPr lang="ru-RU" dirty="0" smtClean="0"/>
-              <a:t>Известные </a:t>
-            </a:r>
-            <a:r>
-              <a:rPr lang="en-US" dirty="0" smtClean="0"/>
-              <a:t>LBS-</a:t>
-            </a:r>
-            <a:r>
-              <a:rPr lang="ru-RU" dirty="0" smtClean="0"/>
-              <a:t>сервисы: </a:t>
-            </a:r>
-            <a:r>
-              <a:rPr lang="ru-RU" dirty="0" err="1"/>
-              <a:t>Google</a:t>
-            </a:r>
-            <a:r>
-              <a:rPr lang="ru-RU" dirty="0"/>
-              <a:t> </a:t>
-            </a:r>
-            <a:r>
-              <a:rPr lang="ru-RU" dirty="0" err="1" smtClean="0"/>
-              <a:t>Latitude</a:t>
-            </a:r>
-            <a:r>
-              <a:rPr lang="ru-RU" dirty="0" smtClean="0"/>
-              <a:t>, </a:t>
-            </a:r>
-            <a:r>
-              <a:rPr lang="ru-RU" dirty="0" err="1" smtClean="0"/>
-              <a:t>AlterGeo</a:t>
-            </a:r>
-            <a:r>
-              <a:rPr lang="ru-RU" dirty="0" smtClean="0"/>
-              <a:t>, </a:t>
-            </a:r>
-            <a:r>
-              <a:rPr lang="ru-RU" dirty="0" err="1" smtClean="0"/>
-              <a:t>BluePont</a:t>
-            </a:r>
-            <a:r>
-              <a:rPr lang="ru-RU" dirty="0" smtClean="0"/>
-              <a:t>, </a:t>
-            </a:r>
-            <a:r>
-              <a:rPr lang="ru-RU" dirty="0" err="1" smtClean="0"/>
-              <a:t>Foursquare</a:t>
-            </a:r>
-            <a:r>
-              <a:rPr lang="ru-RU" dirty="0" smtClean="0"/>
-              <a:t> и т.д.</a:t>
+            <a:r>
+              <a:rPr lang="en-US" dirty="0" err="1" smtClean="0"/>
+              <a:t>Forsquare</a:t>
             </a:r>
             <a:endParaRPr lang="ru-RU" dirty="0"/>
           </a:p>
-          <a:p>
-            <a:endParaRPr lang="ru-RU" dirty="0"/>
+        </p:txBody>
+      </p:sp>
+      <p:sp>
+        <p:nvSpPr>
+          <p:cNvPr id="4" name="Номер слайда 3"/>
+          <p:cNvSpPr>
+            <a:spLocks noGrp="1"/>
+          </p:cNvSpPr>
+          <p:nvPr>
+            <p:ph type="sldNum" sz="quarter" idx="12"/>
+          </p:nvPr>
+        </p:nvSpPr>
+        <p:spPr/>
+        <p:txBody>
+          <a:bodyPr/>
+          <a:lstStyle/>
+          <a:p>
+            <a:fld id="{9A39E707-F3CE-4BEB-9583-BB36F29193FA}" type="slidenum">
+              <a:rPr lang="ru-RU" smtClean="0"/>
+              <a:pPr/>
+              <a:t>13</a:t>
+            </a:fld>
+            <a:endParaRPr lang="ru-RU"/>
           </a:p>
         </p:txBody>
       </p:sp>
@@ -3889,8 +4399,20 @@
           <a:lstStyle/>
           <a:p>
             <a:r>
-              <a:rPr lang="ru-RU" dirty="0" smtClean="0"/>
-              <a:t>Аналоги разрабатываемого приложения</a:t>
+              <a:rPr lang="ru-RU" dirty="0"/>
+              <a:t>Особенности разработки </a:t>
+            </a:r>
+            <a:r>
+              <a:rPr lang="en-US" dirty="0"/>
+              <a:t>AR</a:t>
+            </a:r>
+            <a:r>
+              <a:rPr lang="ru-RU" dirty="0"/>
+              <a:t>-приложений под </a:t>
+            </a:r>
+            <a:r>
+              <a:rPr lang="en-US" dirty="0"/>
+              <a:t>Android</a:t>
             </a:r>
             <a:endParaRPr lang="ru-RU" dirty="0"/>
           </a:p>
@@ -3908,67 +4430,98 @@
         </p:nvSpPr>
         <p:spPr/>
         <p:txBody>
-          <a:bodyPr/>
-          <a:lstStyle/>
-          <a:p>
-            <a:r>
-              <a:rPr lang="en-US" dirty="0" err="1" smtClean="0"/>
-              <a:t>Layar</a:t>
-            </a:r>
-            <a:r>
-              <a:rPr lang="en-US" dirty="0" smtClean="0"/>
+          <a:bodyPr>
+            <a:normAutofit lnSpcReduction="10000"/>
+          </a:bodyPr>
+          <a:lstStyle/>
+          <a:p>
+            <a:pPr lvl="0"/>
+            <a:r>
+              <a:rPr lang="ru-RU" dirty="0"/>
+              <a:t>Камера</a:t>
+            </a:r>
+          </a:p>
+          <a:p>
+            <a:pPr lvl="0"/>
+            <a:r>
+              <a:rPr lang="en-US" dirty="0"/>
+              <a:t>OpenGL ES</a:t>
+            </a:r>
+            <a:r>
+              <a:rPr lang="ru-RU" dirty="0"/>
+              <a:t> – библиотека для </a:t>
+            </a:r>
+            <a:r>
+              <a:rPr lang="ru-RU" dirty="0" err="1"/>
+              <a:t>отрисовки</a:t>
+            </a:r>
+            <a:r>
+              <a:rPr lang="ru-RU" dirty="0"/>
+              <a:t> объектов </a:t>
+            </a:r>
+          </a:p>
+          <a:p>
+            <a:pPr lvl="0"/>
+            <a:r>
+              <a:rPr lang="ru-RU" dirty="0"/>
+              <a:t>Гироскоп/акселерометр – для определения изменений положения мобильного устройства в пространстве</a:t>
+            </a:r>
+          </a:p>
+          <a:p>
+            <a:pPr lvl="0"/>
+            <a:r>
+              <a:rPr lang="en-US" dirty="0" err="1"/>
+              <a:t>LocationManager</a:t>
+            </a:r>
+            <a:r>
+              <a:rPr lang="ru-RU" dirty="0"/>
+              <a:t> – для определения координат </a:t>
+            </a:r>
+          </a:p>
+          <a:p>
+            <a:pPr lvl="0"/>
+            <a:r>
+              <a:rPr lang="ru-RU" dirty="0"/>
+              <a:t>Вспомогательная библиотека/</a:t>
+            </a:r>
+            <a:r>
+              <a:rPr lang="ru-RU" dirty="0" err="1"/>
+              <a:t>фреймворк</a:t>
+            </a:r>
+            <a:r>
+              <a:rPr lang="ru-RU" dirty="0"/>
               <a:t> </a:t>
             </a:r>
-            <a:r>
-              <a:rPr lang="en-US" dirty="0"/>
-              <a:t>Reality Browser</a:t>
-            </a:r>
-            <a:r>
-              <a:rPr lang="ru-RU" dirty="0"/>
-              <a:t>.</a:t>
-            </a:r>
-          </a:p>
-          <a:p>
-            <a:r>
-              <a:rPr lang="en-US" dirty="0" err="1" smtClean="0"/>
-              <a:t>WikiTude</a:t>
-            </a:r>
-            <a:r>
-              <a:rPr lang="en-US" dirty="0" smtClean="0"/>
-              <a:t> </a:t>
-            </a:r>
-            <a:r>
-              <a:rPr lang="en-US" dirty="0"/>
-              <a:t>Drive.</a:t>
-            </a:r>
+          </a:p>
+          <a:p>
+            <a:pPr>
+              <a:buNone/>
+            </a:pPr>
             <a:endParaRPr lang="ru-RU" dirty="0"/>
           </a:p>
-          <a:p>
-            <a:r>
-              <a:rPr lang="en-US" dirty="0" err="1" smtClean="0"/>
-              <a:t>TagWhat</a:t>
-            </a:r>
-            <a:r>
-              <a:rPr lang="ru-RU" dirty="0"/>
-              <a:t>.</a:t>
-            </a:r>
-          </a:p>
-          <a:p>
-            <a:r>
-              <a:rPr lang="en-US" dirty="0" err="1" smtClean="0"/>
-              <a:t>Augement</a:t>
-            </a:r>
-            <a:r>
-              <a:rPr lang="ru-RU" dirty="0"/>
-              <a:t>.</a:t>
-            </a:r>
-          </a:p>
-          <a:p>
-            <a:r>
-              <a:rPr lang="en-US" dirty="0" err="1" smtClean="0"/>
-              <a:t>Forsquare</a:t>
-            </a:r>
-            <a:endParaRPr lang="ru-RU" dirty="0"/>
+        </p:txBody>
+      </p:sp>
+      <p:sp>
+        <p:nvSpPr>
+          <p:cNvPr id="4" name="Номер слайда 3"/>
+          <p:cNvSpPr>
+            <a:spLocks noGrp="1"/>
+          </p:cNvSpPr>
+          <p:nvPr>
+            <p:ph type="sldNum" sz="quarter" idx="12"/>
+          </p:nvPr>
+        </p:nvSpPr>
+        <p:spPr/>
+        <p:txBody>
+          <a:bodyPr/>
+          <a:lstStyle/>
+          <a:p>
+            <a:fld id="{9A39E707-F3CE-4BEB-9583-BB36F29193FA}" type="slidenum">
+              <a:rPr lang="ru-RU" smtClean="0"/>
+              <a:pPr/>
+              <a:t>14</a:t>
+            </a:fld>
+            <a:endParaRPr lang="ru-RU"/>
           </a:p>
         </p:txBody>
       </p:sp>
@@ -4022,19 +4575,11 @@
           <a:lstStyle/>
           <a:p>
             <a:r>
-              <a:rPr lang="ru-RU" dirty="0"/>
-              <a:t>Особенности разработки </a:t>
-            </a:r>
-            <a:r>
-              <a:rPr lang="en-US" dirty="0"/>
-              <a:t>AR</a:t>
-            </a:r>
-            <a:r>
-              <a:rPr lang="ru-RU" dirty="0"/>
-              <a:t>-приложений под </a:t>
-            </a:r>
-            <a:r>
-              <a:rPr lang="en-US" dirty="0"/>
+              <a:rPr lang="ru-RU" dirty="0" smtClean="0"/>
+              <a:t>Возможности визуализации в </a:t>
+            </a:r>
+            <a:r>
+              <a:rPr lang="en-US" dirty="0" smtClean="0"/>
               <a:t>Android</a:t>
             </a:r>
             <a:endParaRPr lang="ru-RU" dirty="0"/>
@@ -4053,74 +4598,48 @@
         </p:nvSpPr>
         <p:spPr/>
         <p:txBody>
-          <a:bodyPr>
-            <a:normAutofit lnSpcReduction="10000"/>
-          </a:bodyPr>
-          <a:lstStyle/>
-          <a:p>
-            <a:pPr lvl="0"/>
-            <a:r>
-              <a:rPr lang="ru-RU" dirty="0"/>
-              <a:t>Камера</a:t>
-            </a:r>
-          </a:p>
-          <a:p>
-            <a:pPr lvl="0"/>
-            <a:r>
-              <a:rPr lang="en-US" dirty="0"/>
+          <a:bodyPr/>
+          <a:lstStyle/>
+          <a:p>
+            <a:r>
+              <a:rPr lang="en-US" dirty="0" smtClean="0"/>
               <a:t>OpenGL ES</a:t>
             </a:r>
-            <a:r>
-              <a:rPr lang="ru-RU" dirty="0"/>
-              <a:t> – библиотека для </a:t>
-            </a:r>
-            <a:r>
-              <a:rPr lang="ru-RU" dirty="0" err="1"/>
-              <a:t>отрисовки</a:t>
-            </a:r>
-            <a:r>
-              <a:rPr lang="ru-RU" dirty="0"/>
-              <a:t> объектов </a:t>
-            </a:r>
-          </a:p>
-          <a:p>
-            <a:pPr lvl="0"/>
-            <a:r>
-              <a:rPr lang="ru-RU" dirty="0"/>
-              <a:t>Гироскоп/акселерометр – для определения изменений положения мобильного устройства в пространстве</a:t>
-            </a:r>
-          </a:p>
-          <a:p>
-            <a:pPr lvl="0"/>
-            <a:r>
-              <a:rPr lang="en-US" dirty="0" err="1"/>
-              <a:t>LocationManager</a:t>
-            </a:r>
-            <a:r>
-              <a:rPr lang="ru-RU" dirty="0"/>
-              <a:t> – для определения координат </a:t>
-            </a:r>
-          </a:p>
-          <a:p>
-            <a:pPr lvl="0"/>
-            <a:r>
-              <a:rPr lang="ru-RU" dirty="0"/>
-              <a:t>Вспомогательная библиотека/</a:t>
-            </a:r>
-            <a:r>
-              <a:rPr lang="ru-RU" dirty="0" err="1"/>
-              <a:t>фреймворк</a:t>
-            </a:r>
-            <a:r>
-              <a:rPr lang="ru-RU" dirty="0"/>
-              <a:t> </a:t>
-            </a:r>
-          </a:p>
-          <a:p>
-            <a:pPr>
-              <a:buNone/>
-            </a:pPr>
+          </a:p>
+          <a:p>
+            <a:r>
+              <a:rPr lang="en-US" dirty="0" err="1" smtClean="0"/>
+              <a:t>Android.graphics</a:t>
+            </a:r>
+            <a:r>
+              <a:rPr lang="en-US" dirty="0" smtClean="0"/>
+              <a:t>.*</a:t>
+            </a:r>
             <a:endParaRPr lang="ru-RU" dirty="0"/>
+          </a:p>
+        </p:txBody>
+      </p:sp>
+      <p:sp>
+        <p:nvSpPr>
+          <p:cNvPr id="4" name="Номер слайда 3"/>
+          <p:cNvSpPr>
+            <a:spLocks noGrp="1"/>
+          </p:cNvSpPr>
+          <p:nvPr>
+            <p:ph type="sldNum" sz="quarter" idx="12"/>
+          </p:nvPr>
+        </p:nvSpPr>
+        <p:spPr/>
+        <p:txBody>
+          <a:bodyPr/>
+          <a:lstStyle/>
+          <a:p>
+            <a:fld id="{9A39E707-F3CE-4BEB-9583-BB36F29193FA}" type="slidenum">
+              <a:rPr lang="ru-RU" smtClean="0"/>
+              <a:pPr/>
+              <a:t>15</a:t>
+            </a:fld>
+            <a:endParaRPr lang="ru-RU"/>
           </a:p>
         </p:txBody>
       </p:sp>
@@ -4175,219 +4694,105 @@
           <a:p>
             <a:r>
               <a:rPr lang="ru-RU" dirty="0" smtClean="0"/>
-              <a:t>Существующие </a:t>
-            </a:r>
-            <a:r>
-              <a:rPr lang="ru-RU" dirty="0"/>
-              <a:t>библиотеки и </a:t>
-            </a:r>
-            <a:r>
-              <a:rPr lang="ru-RU" dirty="0" err="1"/>
-              <a:t>фреймворки</a:t>
-            </a:r>
-            <a:r>
-              <a:rPr lang="ru-RU" dirty="0"/>
-              <a:t> для создания </a:t>
-            </a:r>
-            <a:r>
-              <a:rPr lang="en-US" dirty="0"/>
-              <a:t>AR</a:t>
-            </a:r>
-            <a:r>
-              <a:rPr lang="ru-RU" dirty="0"/>
-              <a:t>-приложений под </a:t>
+              <a:t>Инструменты, выбранные для разработки</a:t>
+            </a:r>
+            <a:endParaRPr lang="ru-RU" dirty="0"/>
+          </a:p>
+        </p:txBody>
+      </p:sp>
+      <p:sp>
+        <p:nvSpPr>
+          <p:cNvPr id="3" name="Содержимое 2"/>
+          <p:cNvSpPr>
+            <a:spLocks noGrp="1"/>
+          </p:cNvSpPr>
+          <p:nvPr>
+            <p:ph idx="1"/>
+          </p:nvPr>
+        </p:nvSpPr>
+        <p:spPr/>
+        <p:txBody>
+          <a:bodyPr/>
+          <a:lstStyle/>
+          <a:p>
+            <a:r>
+              <a:rPr lang="ru-RU" dirty="0" smtClean="0"/>
+              <a:t>Язык: </a:t>
             </a:r>
             <a:r>
               <a:rPr lang="en-US" dirty="0" smtClean="0"/>
-              <a:t>Android</a:t>
-            </a:r>
-            <a:endParaRPr lang="ru-RU" dirty="0"/>
-          </a:p>
-        </p:txBody>
-      </p:sp>
-      <p:sp>
-        <p:nvSpPr>
-          <p:cNvPr id="3" name="Содержимое 2"/>
-          <p:cNvSpPr>
-            <a:spLocks noGrp="1"/>
-          </p:cNvSpPr>
-          <p:nvPr>
-            <p:ph idx="1"/>
-          </p:nvPr>
-        </p:nvSpPr>
-        <p:spPr>
-          <a:xfrm>
-            <a:off x="500034" y="1857364"/>
-            <a:ext cx="8229600" cy="4525963"/>
-          </a:xfrm>
-        </p:spPr>
-        <p:txBody>
-          <a:bodyPr>
-            <a:normAutofit fontScale="77500" lnSpcReduction="20000"/>
-          </a:bodyPr>
-          <a:lstStyle/>
-          <a:p>
-            <a:r>
-              <a:rPr lang="en-US" dirty="0" err="1" smtClean="0"/>
-              <a:t>Vuforia</a:t>
-            </a:r>
-            <a:r>
-              <a:rPr lang="en-US" dirty="0" smtClean="0"/>
-              <a:t> SDK</a:t>
-            </a:r>
+              <a:t>Java</a:t>
+            </a:r>
+            <a:endParaRPr lang="ru-RU" dirty="0" smtClean="0"/>
+          </a:p>
+          <a:p>
             <a:r>
               <a:rPr lang="ru-RU" dirty="0" smtClean="0"/>
-              <a:t> (</a:t>
-            </a:r>
-            <a:r>
-              <a:rPr lang="en-US" dirty="0" smtClean="0"/>
-              <a:t>developer.vuforia.com</a:t>
-            </a:r>
-            <a:r>
-              <a:rPr lang="ru-RU" dirty="0" smtClean="0"/>
-              <a:t>)</a:t>
-            </a:r>
-          </a:p>
-          <a:p>
-            <a:endParaRPr lang="ru-RU" dirty="0"/>
-          </a:p>
-          <a:p>
-            <a:r>
-              <a:rPr lang="en-US" dirty="0" err="1" smtClean="0"/>
-              <a:t>AndAR</a:t>
+              <a:t>Среда разработки:</a:t>
             </a:r>
             <a:r>
               <a:rPr lang="en-US" dirty="0" smtClean="0"/>
               <a:t> </a:t>
             </a:r>
             <a:r>
+              <a:rPr lang="en-US" dirty="0" err="1" smtClean="0"/>
+              <a:t>Intellij</a:t>
+            </a:r>
+            <a:r>
+              <a:rPr lang="en-US" dirty="0" smtClean="0"/>
+              <a:t> Idea</a:t>
+            </a:r>
+            <a:endParaRPr lang="ru-RU" dirty="0" smtClean="0"/>
+          </a:p>
+          <a:p>
+            <a:r>
               <a:rPr lang="ru-RU" dirty="0" smtClean="0"/>
-              <a:t>(</a:t>
+              <a:t>Визуализация:</a:t>
             </a:r>
             <a:r>
               <a:rPr lang="en-US" dirty="0" smtClean="0"/>
-              <a:t>code.google.com/p/</a:t>
+              <a:t> OpenGL ES + </a:t>
             </a:r>
             <a:r>
               <a:rPr lang="en-US" dirty="0" err="1" smtClean="0"/>
-              <a:t>andar</a:t>
-            </a:r>
+              <a:t>android.graphics</a:t>
+            </a:r>
+            <a:endParaRPr lang="ru-RU" dirty="0" smtClean="0"/>
+          </a:p>
+          <a:p>
             <a:r>
               <a:rPr lang="ru-RU" dirty="0" smtClean="0"/>
-              <a:t>)</a:t>
-            </a:r>
-          </a:p>
-          <a:p>
-            <a:endParaRPr lang="ru-RU" dirty="0"/>
-          </a:p>
-          <a:p>
+              <a:t>Вспомогательные инструменты: </a:t>
+            </a:r>
             <a:r>
               <a:rPr lang="en-US" dirty="0" err="1" smtClean="0"/>
               <a:t>Mixare</a:t>
             </a:r>
-            <a:r>
-              <a:rPr lang="en-US" dirty="0" smtClean="0"/>
-              <a:t> </a:t>
-            </a:r>
-            <a:r>
-              <a:rPr lang="ru-RU" dirty="0" smtClean="0"/>
-              <a:t>(</a:t>
-            </a:r>
-            <a:r>
-              <a:rPr lang="en-US" dirty="0" smtClean="0"/>
-              <a:t>code.google.com/p/</a:t>
-            </a:r>
-            <a:r>
-              <a:rPr lang="en-US" dirty="0" err="1" smtClean="0"/>
-              <a:t>mixare</a:t>
-            </a:r>
-            <a:r>
-              <a:rPr lang="ru-RU" dirty="0" smtClean="0"/>
-              <a:t>)</a:t>
-            </a:r>
-          </a:p>
-          <a:p>
             <a:endParaRPr lang="ru-RU" dirty="0"/>
           </a:p>
-          <a:p>
-            <a:r>
-              <a:rPr lang="en-US" dirty="0" smtClean="0"/>
-              <a:t>Look!</a:t>
-            </a:r>
-            <a:r>
-              <a:rPr lang="ru-RU" dirty="0" smtClean="0"/>
-              <a:t> </a:t>
-            </a:r>
-            <a:r>
-              <a:rPr lang="en-US" dirty="0" smtClean="0"/>
-              <a:t> </a:t>
-            </a:r>
-            <a:r>
-              <a:rPr lang="ru-RU" dirty="0" smtClean="0"/>
-              <a:t>( </a:t>
-            </a:r>
-            <a:r>
-              <a:rPr lang="en-US" dirty="0" smtClean="0"/>
-              <a:t>www.lookar.net</a:t>
-            </a:r>
-            <a:r>
-              <a:rPr lang="ru-RU" dirty="0" smtClean="0"/>
-              <a:t> )</a:t>
-            </a:r>
-          </a:p>
-          <a:p>
-            <a:endParaRPr lang="ru-RU" dirty="0"/>
-          </a:p>
-          <a:p>
-            <a:r>
-              <a:rPr lang="en-US" dirty="0" err="1" smtClean="0"/>
-              <a:t>LibreGeoSocial</a:t>
-            </a:r>
-            <a:r>
-              <a:rPr lang="en-US" dirty="0" smtClean="0"/>
-              <a:t> </a:t>
-            </a:r>
-            <a:r>
-              <a:rPr lang="ru-RU" dirty="0" smtClean="0"/>
-              <a:t> (</a:t>
-            </a:r>
-            <a:r>
-              <a:rPr lang="en-US" dirty="0" smtClean="0"/>
-              <a:t>www.libregeosocial.org</a:t>
-            </a:r>
-            <a:r>
-              <a:rPr lang="ru-RU" dirty="0" smtClean="0"/>
-              <a:t> )</a:t>
-            </a:r>
-          </a:p>
-          <a:p>
-            <a:endParaRPr lang="ru-RU" dirty="0"/>
-          </a:p>
-          <a:p>
-            <a:r>
-              <a:rPr lang="en-US" dirty="0" smtClean="0"/>
-              <a:t>android-augment-reality-framework </a:t>
-            </a:r>
-            <a:r>
-              <a:rPr lang="ru-RU" dirty="0" smtClean="0"/>
-              <a:t>(</a:t>
-            </a:r>
-            <a:r>
-              <a:rPr lang="en-US" dirty="0" smtClean="0"/>
-              <a:t>code.google.com/p/android-augment-reality-framework</a:t>
-            </a:r>
-            <a:r>
-              <a:rPr lang="en-US" dirty="0"/>
-              <a:t> </a:t>
-            </a:r>
-            <a:r>
-              <a:rPr lang="ru-RU" dirty="0" smtClean="0"/>
-              <a:t>)</a:t>
-            </a:r>
-            <a:endParaRPr lang="ru-RU" dirty="0"/>
-          </a:p>
-          <a:p>
-            <a:endParaRPr lang="ru-RU" dirty="0"/>
+        </p:txBody>
+      </p:sp>
+      <p:sp>
+        <p:nvSpPr>
+          <p:cNvPr id="4" name="Номер слайда 3"/>
+          <p:cNvSpPr>
+            <a:spLocks noGrp="1"/>
+          </p:cNvSpPr>
+          <p:nvPr>
+            <p:ph type="sldNum" sz="quarter" idx="12"/>
+          </p:nvPr>
+        </p:nvSpPr>
+        <p:spPr/>
+        <p:txBody>
+          <a:bodyPr/>
+          <a:lstStyle/>
+          <a:p>
+            <a:fld id="{9A39E707-F3CE-4BEB-9583-BB36F29193FA}" type="slidenum">
+              <a:rPr lang="ru-RU" smtClean="0"/>
+              <a:pPr/>
+              <a:t>16</a:t>
+            </a:fld>
+            <a:endParaRPr lang="ru-RU"/>
           </a:p>
         </p:txBody>
       </p:sp>
@@ -4435,18 +4840,12 @@
         </p:nvSpPr>
         <p:spPr/>
         <p:txBody>
-          <a:bodyPr>
-            <a:normAutofit fontScale="90000"/>
-          </a:bodyPr>
+          <a:bodyPr/>
           <a:lstStyle/>
           <a:p>
             <a:r>
               <a:rPr lang="ru-RU" dirty="0" smtClean="0"/>
-              <a:t>Возможности визуализации в </a:t>
-            </a:r>
-            <a:r>
-              <a:rPr lang="en-US" dirty="0" smtClean="0"/>
-              <a:t>Android</a:t>
+              <a:t>Диаграмма прецедентов.</a:t>
             </a:r>
             <a:endParaRPr lang="ru-RU" dirty="0"/>
           </a:p>
@@ -4454,49 +4853,68 @@
       </p:sp>
       <p:sp>
         <p:nvSpPr>
-          <p:cNvPr id="3" name="Содержимое 2"/>
-          <p:cNvSpPr>
-            <a:spLocks noGrp="1"/>
-          </p:cNvSpPr>
+          <p:cNvPr id="4" name="Номер слайда 3"/>
+          <p:cNvSpPr>
+            <a:spLocks noGrp="1"/>
+          </p:cNvSpPr>
+          <p:nvPr>
+            <p:ph type="sldNum" sz="quarter" idx="12"/>
+          </p:nvPr>
+        </p:nvSpPr>
+        <p:spPr/>
+        <p:txBody>
+          <a:bodyPr/>
+          <a:lstStyle/>
+          <a:p>
+            <a:fld id="{9A39E707-F3CE-4BEB-9583-BB36F29193FA}" type="slidenum">
+              <a:rPr lang="ru-RU" smtClean="0"/>
+              <a:pPr/>
+              <a:t>17</a:t>
+            </a:fld>
+            <a:endParaRPr lang="ru-RU"/>
+          </a:p>
+        </p:txBody>
+      </p:sp>
+      <p:pic>
+        <p:nvPicPr>
+          <p:cNvPr id="1026" name="Picture 2"/>
+          <p:cNvPicPr>
+            <a:picLocks noGrp="1" noChangeAspect="1" noChangeArrowheads="1"/>
+          </p:cNvPicPr>
           <p:nvPr>
             <p:ph idx="1"/>
           </p:nvPr>
-        </p:nvSpPr>
-        <p:spPr/>
-        <p:txBody>
-          <a:bodyPr/>
-          <a:lstStyle/>
-          <a:p>
-            <a:r>
-              <a:rPr lang="en-US" dirty="0" smtClean="0"/>
-              <a:t>OpenGL ES</a:t>
-            </a:r>
-          </a:p>
-          <a:p>
-            <a:r>
-              <a:rPr lang="en-US" dirty="0" err="1" smtClean="0"/>
-              <a:t>Android.graphics</a:t>
-            </a:r>
-            <a:r>
-              <a:rPr lang="en-US" dirty="0" smtClean="0"/>
-              <a:t>.*</a:t>
-            </a:r>
-            <a:endParaRPr lang="ru-RU" dirty="0"/>
-          </a:p>
-        </p:txBody>
-      </p:sp>
+        </p:nvPicPr>
+        <p:blipFill>
+          <a:blip r:embed="rId2"/>
+          <a:srcRect/>
+          <a:stretch>
+            <a:fillRect/>
+          </a:stretch>
+        </p:blipFill>
+        <p:spPr bwMode="auto">
+          <a:xfrm>
+            <a:off x="1366837" y="1762919"/>
+            <a:ext cx="6410325" cy="4200525"/>
+          </a:xfrm>
+          <a:prstGeom prst="rect">
+            <a:avLst/>
+          </a:prstGeom>
+          <a:noFill/>
+          <a:ln w="9525">
+            <a:noFill/>
+            <a:miter lim="800000"/>
+            <a:headEnd/>
+            <a:tailEnd/>
+          </a:ln>
+          <a:effectLst/>
+        </p:spPr>
+      </p:pic>
     </p:spTree>
   </p:cSld>
   <p:clrMapOvr>
     <a:masterClrMapping/>
   </p:clrMapOvr>
-  <p:timing>
-    <p:tnLst>
-      <p:par>
-        <p:cTn id="1" dur="indefinite" restart="never" nodeType="tmRoot"/>
-      </p:par>
-    </p:tnLst>
-  </p:timing>
 </p:sld>
 </file>
 
@@ -4536,81 +4954,91 @@
           <a:p>
             <a:r>
               <a:rPr lang="ru-RU" dirty="0" smtClean="0"/>
-              <a:t>Инструменты, выбранные для разработки</a:t>
+              <a:t>Описание функционала разработанного приложения, </a:t>
+            </a:r>
+            <a:r>
+              <a:rPr lang="ru-RU" dirty="0" err="1" smtClean="0"/>
+              <a:t>скриншоты</a:t>
             </a:r>
             <a:endParaRPr lang="ru-RU" dirty="0"/>
           </a:p>
         </p:txBody>
       </p:sp>
-      <p:sp>
-        <p:nvSpPr>
-          <p:cNvPr id="3" name="Содержимое 2"/>
-          <p:cNvSpPr>
-            <a:spLocks noGrp="1"/>
-          </p:cNvSpPr>
-          <p:nvPr>
-            <p:ph idx="1"/>
-          </p:nvPr>
-        </p:nvSpPr>
-        <p:spPr/>
-        <p:txBody>
-          <a:bodyPr/>
-          <a:lstStyle/>
-          <a:p>
-            <a:r>
-              <a:rPr lang="ru-RU" dirty="0" smtClean="0"/>
-              <a:t>Язык: </a:t>
-            </a:r>
-            <a:r>
-              <a:rPr lang="en-US" dirty="0" smtClean="0"/>
-              <a:t>Java</a:t>
-            </a:r>
-            <a:endParaRPr lang="ru-RU" dirty="0" smtClean="0"/>
-          </a:p>
-          <a:p>
-            <a:r>
-              <a:rPr lang="ru-RU" dirty="0" smtClean="0"/>
-              <a:t>Среда разработки:</a:t>
-            </a:r>
-            <a:r>
-              <a:rPr lang="en-US" dirty="0" smtClean="0"/>
-              <a:t> </a:t>
-            </a:r>
-            <a:r>
-              <a:rPr lang="en-US" dirty="0" err="1" smtClean="0"/>
-              <a:t>Intellij</a:t>
-            </a:r>
-            <a:r>
-              <a:rPr lang="en-US" dirty="0" smtClean="0"/>
-              <a:t> Idea</a:t>
-            </a:r>
-            <a:endParaRPr lang="ru-RU" dirty="0" smtClean="0"/>
-          </a:p>
-          <a:p>
-            <a:r>
-              <a:rPr lang="ru-RU" dirty="0" smtClean="0"/>
-              <a:t>Визуализация:</a:t>
-            </a:r>
-            <a:r>
-              <a:rPr lang="en-US" dirty="0" smtClean="0"/>
-              <a:t> OpenGL ES + </a:t>
-            </a:r>
-            <a:r>
-              <a:rPr lang="en-US" dirty="0" err="1" smtClean="0"/>
-              <a:t>android.graphics</a:t>
-            </a:r>
-            <a:endParaRPr lang="ru-RU" dirty="0" smtClean="0"/>
-          </a:p>
-          <a:p>
-            <a:r>
-              <a:rPr lang="ru-RU" dirty="0" smtClean="0"/>
-              <a:t>Вспомогательные инструменты: </a:t>
-            </a:r>
-            <a:r>
-              <a:rPr lang="en-US" dirty="0" err="1" smtClean="0"/>
-              <a:t>Mixare</a:t>
-            </a:r>
-            <a:endParaRPr lang="ru-RU" dirty="0"/>
+      <p:pic>
+        <p:nvPicPr>
+          <p:cNvPr id="5" name="Содержимое 4" descr="Screenshot_2013-05-26-19-22-47.png"/>
+          <p:cNvPicPr>
+            <a:picLocks noGrp="1"/>
+          </p:cNvPicPr>
+          <p:nvPr>
+            <p:ph sz="half" idx="1"/>
+          </p:nvPr>
+        </p:nvPicPr>
+        <p:blipFill>
+          <a:blip r:embed="rId2"/>
+          <a:srcRect t="4798"/>
+          <a:stretch>
+            <a:fillRect/>
+          </a:stretch>
+        </p:blipFill>
+        <p:spPr>
+          <a:xfrm>
+            <a:off x="1000100" y="1928802"/>
+            <a:ext cx="2852438" cy="4525963"/>
+          </a:xfrm>
+          <a:prstGeom prst="rect">
+            <a:avLst/>
+          </a:prstGeom>
+        </p:spPr>
+      </p:pic>
+      <p:pic>
+        <p:nvPicPr>
+          <p:cNvPr id="6" name="Содержимое 5" descr="Screenshot_2013-05-26-19-22-30.png"/>
+          <p:cNvPicPr>
+            <a:picLocks noGrp="1"/>
+          </p:cNvPicPr>
+          <p:nvPr>
+            <p:ph sz="half" idx="2"/>
+          </p:nvPr>
+        </p:nvPicPr>
+        <p:blipFill>
+          <a:blip r:embed="rId3"/>
+          <a:srcRect t="4798"/>
+          <a:stretch>
+            <a:fillRect/>
+          </a:stretch>
+        </p:blipFill>
+        <p:spPr>
+          <a:xfrm>
+            <a:off x="5143504" y="1928802"/>
+            <a:ext cx="2852438" cy="4525963"/>
+          </a:xfrm>
+          <a:prstGeom prst="rect">
+            <a:avLst/>
+          </a:prstGeom>
+        </p:spPr>
+      </p:pic>
+      <p:sp>
+        <p:nvSpPr>
+          <p:cNvPr id="7" name="Номер слайда 6"/>
+          <p:cNvSpPr>
+            <a:spLocks noGrp="1"/>
+          </p:cNvSpPr>
+          <p:nvPr>
+            <p:ph type="sldNum" sz="quarter" idx="12"/>
+          </p:nvPr>
+        </p:nvSpPr>
+        <p:spPr/>
+        <p:txBody>
+          <a:bodyPr/>
+          <a:lstStyle/>
+          <a:p>
+            <a:fld id="{9A39E707-F3CE-4BEB-9583-BB36F29193FA}" type="slidenum">
+              <a:rPr lang="ru-RU" smtClean="0"/>
+              <a:pPr/>
+              <a:t>18</a:t>
+            </a:fld>
+            <a:endParaRPr lang="ru-RU"/>
           </a:p>
         </p:txBody>
       </p:sp>
@@ -4677,7 +5105,7 @@
       </p:sp>
       <p:pic>
         <p:nvPicPr>
-          <p:cNvPr id="4" name="Содержимое 3" descr="Screenshot_2013-05-26-19-21-55.png"/>
+          <p:cNvPr id="5" name="Содержимое 4" descr="Screenshot_2013-05-26-19-22-54.png"/>
           <p:cNvPicPr>
             <a:picLocks noGrp="1"/>
           </p:cNvPicPr>
@@ -4687,14 +5115,15 @@
         </p:nvPicPr>
         <p:blipFill>
           <a:blip r:embed="rId2"/>
+          <a:srcRect t="5086"/>
           <a:stretch>
             <a:fillRect/>
           </a:stretch>
         </p:blipFill>
         <p:spPr>
           <a:xfrm>
-            <a:off x="1142976" y="2071678"/>
-            <a:ext cx="2715578" cy="4525963"/>
+            <a:off x="1071538" y="1928802"/>
+            <a:ext cx="2861093" cy="4525963"/>
           </a:xfrm>
           <a:prstGeom prst="rect">
             <a:avLst/>
@@ -4703,7 +5132,7 @@
       </p:pic>
       <p:pic>
         <p:nvPicPr>
-          <p:cNvPr id="6" name="Содержимое 5" descr="Screenshot_2013-05-26-19-22-09.png"/>
+          <p:cNvPr id="6" name="Содержимое 5" descr="Screenshot_2013-05-26-19-23-11.png"/>
           <p:cNvPicPr>
             <a:picLocks noGrp="1"/>
           </p:cNvPicPr>
@@ -4713,21 +5142,45 @@
         </p:nvPicPr>
         <p:blipFill>
           <a:blip r:embed="rId3"/>
-          <a:srcRect t="4607"/>
+          <a:srcRect t="4798"/>
           <a:stretch>
             <a:fillRect/>
           </a:stretch>
         </p:blipFill>
         <p:spPr>
           <a:xfrm>
-            <a:off x="4572000" y="2071678"/>
-            <a:ext cx="2846726" cy="4525963"/>
+            <a:off x="5143504" y="1928802"/>
+            <a:ext cx="2852438" cy="4525963"/>
           </a:xfrm>
           <a:prstGeom prst="rect">
             <a:avLst/>
           </a:prstGeom>
         </p:spPr>
       </p:pic>
+      <p:sp>
+        <p:nvSpPr>
+          <p:cNvPr id="7" name="Номер слайда 6"/>
+          <p:cNvSpPr>
+            <a:spLocks noGrp="1"/>
+          </p:cNvSpPr>
+          <p:nvPr>
+            <p:ph type="sldNum" sz="quarter" idx="12"/>
+          </p:nvPr>
+        </p:nvSpPr>
+        <p:spPr/>
+        <p:txBody>
+          <a:bodyPr/>
+          <a:lstStyle/>
+          <a:p>
+            <a:fld id="{9A39E707-F3CE-4BEB-9583-BB36F29193FA}" type="slidenum">
+              <a:rPr lang="ru-RU" smtClean="0"/>
+              <a:pPr/>
+              <a:t>19</a:t>
+            </a:fld>
+            <a:endParaRPr lang="ru-RU"/>
+          </a:p>
+        </p:txBody>
+      </p:sp>
     </p:spTree>
   </p:cSld>
   <p:clrMapOvr>
@@ -4777,7 +5230,7 @@
           <a:p>
             <a:r>
               <a:rPr lang="ru-RU" dirty="0" smtClean="0"/>
-              <a:t>Цели дипломной работы</a:t>
+              <a:t>Цель дипломной работы</a:t>
             </a:r>
             <a:endParaRPr lang="ru-RU" dirty="0"/>
           </a:p>
@@ -4796,9 +5249,60 @@
         <p:spPr/>
         <p:txBody>
           <a:bodyPr>
-            <a:normAutofit fontScale="92500"/>
+            <a:normAutofit fontScale="92500" lnSpcReduction="10000"/>
           </a:bodyPr>
           <a:lstStyle/>
+          <a:p>
+            <a:r>
+              <a:rPr lang="ru-RU" dirty="0" smtClean="0"/>
+              <a:t>Разработка </a:t>
+            </a:r>
+            <a:r>
+              <a:rPr lang="ru-RU" dirty="0"/>
+              <a:t>приложения-клиента под </a:t>
+            </a:r>
+            <a:r>
+              <a:rPr lang="en-US" dirty="0"/>
+              <a:t>Android</a:t>
+            </a:r>
+            <a:r>
+              <a:rPr lang="ru-RU" dirty="0"/>
+              <a:t> для </a:t>
+            </a:r>
+            <a:r>
+              <a:rPr lang="ru-RU" dirty="0" err="1"/>
+              <a:t>геолокационной</a:t>
+            </a:r>
+            <a:r>
+              <a:rPr lang="ru-RU" dirty="0"/>
+              <a:t> системы </a:t>
+            </a:r>
+            <a:r>
+              <a:rPr lang="en-US" dirty="0"/>
+              <a:t>Geo</a:t>
+            </a:r>
+            <a:r>
+              <a:rPr lang="ru-RU" dirty="0"/>
+              <a:t>2</a:t>
+            </a:r>
+            <a:r>
+              <a:rPr lang="en-US" dirty="0"/>
+              <a:t>tag</a:t>
+            </a:r>
+            <a:r>
+              <a:rPr lang="ru-RU" dirty="0" smtClean="0"/>
+              <a:t>.</a:t>
+            </a:r>
+          </a:p>
+          <a:p>
+            <a:pPr>
+              <a:buNone/>
+            </a:pPr>
+            <a:r>
+              <a:rPr lang="ru-RU" dirty="0" smtClean="0"/>
+              <a:t>Задачи:</a:t>
+            </a:r>
+          </a:p>
           <a:p>
             <a:r>
               <a:rPr lang="ru-RU" dirty="0" smtClean="0"/>
@@ -4833,49 +5337,37 @@
             <a:endParaRPr lang="ru-RU" dirty="0" smtClean="0"/>
           </a:p>
           <a:p>
-            <a:r>
-              <a:rPr lang="ru-RU" dirty="0" smtClean="0"/>
-              <a:t>Разработка </a:t>
-            </a:r>
-            <a:r>
-              <a:rPr lang="ru-RU" dirty="0"/>
-              <a:t>приложения-клиента под </a:t>
-            </a:r>
-            <a:r>
-              <a:rPr lang="en-US" dirty="0"/>
-              <a:t>Android</a:t>
-            </a:r>
-            <a:r>
-              <a:rPr lang="ru-RU" dirty="0"/>
-              <a:t> для </a:t>
-            </a:r>
-            <a:r>
-              <a:rPr lang="ru-RU" dirty="0" err="1"/>
-              <a:t>геолокационной</a:t>
-            </a:r>
-            <a:r>
-              <a:rPr lang="ru-RU" dirty="0"/>
-              <a:t> системы </a:t>
-            </a:r>
-            <a:r>
-              <a:rPr lang="en-US" dirty="0"/>
-              <a:t>Geo</a:t>
-            </a:r>
-            <a:r>
-              <a:rPr lang="ru-RU" dirty="0"/>
+            <a:pPr>
+              <a:buNone/>
+            </a:pPr>
+            <a:endParaRPr lang="ru-RU" dirty="0"/>
+          </a:p>
+          <a:p>
+            <a:endParaRPr lang="ru-RU" dirty="0"/>
+          </a:p>
+        </p:txBody>
+      </p:sp>
+      <p:sp>
+        <p:nvSpPr>
+          <p:cNvPr id="4" name="Номер слайда 3"/>
+          <p:cNvSpPr>
+            <a:spLocks noGrp="1"/>
+          </p:cNvSpPr>
+          <p:nvPr>
+            <p:ph type="sldNum" sz="quarter" idx="12"/>
+          </p:nvPr>
+        </p:nvSpPr>
+        <p:spPr/>
+        <p:txBody>
+          <a:bodyPr/>
+          <a:lstStyle/>
+          <a:p>
+            <a:fld id="{9A39E707-F3CE-4BEB-9583-BB36F29193FA}" type="slidenum">
+              <a:rPr lang="ru-RU" smtClean="0"/>
+              <a:pPr/>
               <a:t>2</a:t>
-            </a:r>
-            <a:r>
-              <a:rPr lang="en-US" dirty="0"/>
-              <a:t>tag</a:t>
-            </a:r>
-            <a:r>
-              <a:rPr lang="ru-RU" dirty="0"/>
-              <a:t>.</a:t>
-            </a:r>
-          </a:p>
-          <a:p>
-            <a:endParaRPr lang="ru-RU" dirty="0"/>
+            </a:fld>
+            <a:endParaRPr lang="ru-RU"/>
           </a:p>
         </p:txBody>
       </p:sp>
@@ -4942,7 +5434,7 @@
       </p:sp>
       <p:pic>
         <p:nvPicPr>
-          <p:cNvPr id="5" name="Содержимое 4" descr="Screenshot_2013-05-26-19-22-13.png"/>
+          <p:cNvPr id="5" name="Picture 2"/>
           <p:cNvPicPr>
             <a:picLocks noGrp="1"/>
           </p:cNvPicPr>
@@ -4951,16 +5443,21 @@
           </p:nvPr>
         </p:nvPicPr>
         <p:blipFill>
-          <a:blip r:embed="rId2"/>
-          <a:srcRect t="4607"/>
+          <a:blip r:embed="rId2">
+            <a:extLst>
+              <a:ext uri="{28A0092B-C50C-407E-A947-70E740481C1C}">
+                <a14:useLocalDpi xmlns="" xmlns:wpc="http://schemas.microsoft.com/office/word/2010/wordprocessingCanvas" xmlns:mc="http://schemas.openxmlformats.org/markup-compatibility/2006" xmlns:o="urn:schemas-microsoft-com:office:office" xmlns:m="http://schemas.openxmlformats.org/officeDocument/2006/math" xmlns:v="urn:schemas-microsoft-com:vml" xmlns:wp14="http://schemas.microsoft.com/office/word/2010/wordprocessingDrawing" xmlns:wp="http://schemas.openxmlformats.org/drawingml/2006/wordprocessingDrawing" xmlns:w10="urn:schemas-microsoft-com:office:word" xmlns:w="http://schemas.openxmlformats.org/wordprocessingml/2006/main" xmlns:w14="http://schemas.microsoft.com/office/word/2010/wordml" xmlns:wpg="http://schemas.microsoft.com/office/word/2010/wordprocessingGroup" xmlns:wpi="http://schemas.microsoft.com/office/word/2010/wordprocessingInk" xmlns:wne="http://schemas.microsoft.com/office/word/2006/wordml" xmlns:wps="http://schemas.microsoft.com/office/word/2010/wordprocessingShape" xmlns:a14="http://schemas.microsoft.com/office/drawing/2010/main" xmlns:pic="http://schemas.openxmlformats.org/drawingml/2006/picture" xmlns:lc="http://schemas.openxmlformats.org/drawingml/2006/lockedCanvas" val="0"/>
+              </a:ext>
+            </a:extLst>
+          </a:blip>
           <a:stretch>
             <a:fillRect/>
           </a:stretch>
         </p:blipFill>
         <p:spPr>
           <a:xfrm>
-            <a:off x="1142976" y="1928802"/>
-            <a:ext cx="2846726" cy="4525963"/>
+            <a:off x="457200" y="2651601"/>
+            <a:ext cx="4038600" cy="2423160"/>
           </a:xfrm>
           <a:prstGeom prst="rect">
             <a:avLst/>
@@ -4969,7 +5466,7 @@
       </p:pic>
       <p:pic>
         <p:nvPicPr>
-          <p:cNvPr id="6" name="Содержимое 5" descr="Screenshot_2013-05-26-19-22-30.png"/>
+          <p:cNvPr id="6" name="Picture 10"/>
           <p:cNvPicPr>
             <a:picLocks noGrp="1"/>
           </p:cNvPicPr>
@@ -4978,22 +5475,51 @@
           </p:nvPr>
         </p:nvPicPr>
         <p:blipFill>
-          <a:blip r:embed="rId3"/>
-          <a:srcRect t="4798"/>
+          <a:blip r:embed="rId3">
+            <a:extLst>
+              <a:ext uri="{28A0092B-C50C-407E-A947-70E740481C1C}">
+                <a14:useLocalDpi xmlns="" xmlns:wpc="http://schemas.microsoft.com/office/word/2010/wordprocessingCanvas" xmlns:mc="http://schemas.openxmlformats.org/markup-compatibility/2006" xmlns:o="urn:schemas-microsoft-com:office:office" xmlns:m="http://schemas.openxmlformats.org/officeDocument/2006/math" xmlns:v="urn:schemas-microsoft-com:vml" xmlns:wp14="http://schemas.microsoft.com/office/word/2010/wordprocessingDrawing" xmlns:wp="http://schemas.openxmlformats.org/drawingml/2006/wordprocessingDrawing" xmlns:w10="urn:schemas-microsoft-com:office:word" xmlns:w="http://schemas.openxmlformats.org/wordprocessingml/2006/main" xmlns:w14="http://schemas.microsoft.com/office/word/2010/wordml" xmlns:wpg="http://schemas.microsoft.com/office/word/2010/wordprocessingGroup" xmlns:wpi="http://schemas.microsoft.com/office/word/2010/wordprocessingInk" xmlns:wne="http://schemas.microsoft.com/office/word/2006/wordml" xmlns:wps="http://schemas.microsoft.com/office/word/2010/wordprocessingShape" xmlns:a14="http://schemas.microsoft.com/office/drawing/2010/main" xmlns:pic="http://schemas.openxmlformats.org/drawingml/2006/picture" xmlns:lc="http://schemas.openxmlformats.org/drawingml/2006/lockedCanvas" val="0"/>
+              </a:ext>
+            </a:extLst>
+          </a:blip>
           <a:stretch>
             <a:fillRect/>
           </a:stretch>
         </p:blipFill>
         <p:spPr>
           <a:xfrm>
-            <a:off x="5143504" y="1928802"/>
-            <a:ext cx="2852438" cy="4525963"/>
+            <a:off x="4648200" y="2651601"/>
+            <a:ext cx="4038600" cy="2423160"/>
           </a:xfrm>
           <a:prstGeom prst="rect">
             <a:avLst/>
           </a:prstGeom>
         </p:spPr>
       </p:pic>
+      <p:sp>
+        <p:nvSpPr>
+          <p:cNvPr id="7" name="Номер слайда 6"/>
+          <p:cNvSpPr>
+            <a:spLocks noGrp="1"/>
+          </p:cNvSpPr>
+          <p:nvPr>
+            <p:ph type="sldNum" sz="quarter" idx="12"/>
+          </p:nvPr>
+        </p:nvSpPr>
+        <p:spPr/>
+        <p:txBody>
+          <a:bodyPr/>
+          <a:lstStyle/>
+          <a:p>
+            <a:fld id="{9A39E707-F3CE-4BEB-9583-BB36F29193FA}" type="slidenum">
+              <a:rPr lang="ru-RU" smtClean="0"/>
+              <a:pPr/>
+              <a:t>20</a:t>
+            </a:fld>
+            <a:endParaRPr lang="ru-RU"/>
+          </a:p>
+        </p:txBody>
+      </p:sp>
     </p:spTree>
   </p:cSld>
   <p:clrMapOvr>
@@ -5038,449 +5564,6 @@
         </p:nvSpPr>
         <p:spPr/>
         <p:txBody>
-          <a:bodyPr>
-            <a:normAutofit fontScale="90000"/>
-          </a:bodyPr>
-          <a:lstStyle/>
-          <a:p>
-            <a:r>
-              <a:rPr lang="ru-RU" dirty="0" smtClean="0"/>
-              <a:t>Описание функционала разработанного приложения, </a:t>
-            </a:r>
-            <a:r>
-              <a:rPr lang="ru-RU" dirty="0" err="1" smtClean="0"/>
-              <a:t>скриншоты</a:t>
-            </a:r>
-            <a:endParaRPr lang="ru-RU" dirty="0"/>
-          </a:p>
-        </p:txBody>
-      </p:sp>
-      <p:pic>
-        <p:nvPicPr>
-          <p:cNvPr id="5" name="Содержимое 4" descr="Screenshot_2013-05-26-19-22-47.png"/>
-          <p:cNvPicPr>
-            <a:picLocks noGrp="1"/>
-          </p:cNvPicPr>
-          <p:nvPr>
-            <p:ph sz="half" idx="1"/>
-          </p:nvPr>
-        </p:nvPicPr>
-        <p:blipFill>
-          <a:blip r:embed="rId2"/>
-          <a:srcRect t="4798"/>
-          <a:stretch>
-            <a:fillRect/>
-          </a:stretch>
-        </p:blipFill>
-        <p:spPr>
-          <a:xfrm>
-            <a:off x="1000100" y="1928802"/>
-            <a:ext cx="2852438" cy="4525963"/>
-          </a:xfrm>
-          <a:prstGeom prst="rect">
-            <a:avLst/>
-          </a:prstGeom>
-        </p:spPr>
-      </p:pic>
-      <p:pic>
-        <p:nvPicPr>
-          <p:cNvPr id="6" name="Содержимое 5" descr="Screenshot_2013-05-26-19-22-30.png"/>
-          <p:cNvPicPr>
-            <a:picLocks noGrp="1"/>
-          </p:cNvPicPr>
-          <p:nvPr>
-            <p:ph sz="half" idx="2"/>
-          </p:nvPr>
-        </p:nvPicPr>
-        <p:blipFill>
-          <a:blip r:embed="rId3"/>
-          <a:srcRect t="4798"/>
-          <a:stretch>
-            <a:fillRect/>
-          </a:stretch>
-        </p:blipFill>
-        <p:spPr>
-          <a:xfrm>
-            <a:off x="5143504" y="1928802"/>
-            <a:ext cx="2852438" cy="4525963"/>
-          </a:xfrm>
-          <a:prstGeom prst="rect">
-            <a:avLst/>
-          </a:prstGeom>
-        </p:spPr>
-      </p:pic>
-    </p:spTree>
-  </p:cSld>
-  <p:clrMapOvr>
-    <a:masterClrMapping/>
-  </p:clrMapOvr>
-  <p:timing>
-    <p:tnLst>
-      <p:par>
-        <p:cTn id="1" dur="indefinite" restart="never" nodeType="tmRoot"/>
-      </p:par>
-    </p:tnLst>
-  </p:timing>
-</p:sld>
-</file>
-
-<file path=ppt/slides/slide22.xml><?xml version="1.0" encoding="utf-8"?>
-<p:sld xmlns:a="http://schemas.openxmlformats.org/drawingml/2006/main" xmlns:r="http://schemas.openxmlformats.org/officeDocument/2006/relationships" xmlns:p="http://schemas.openxmlformats.org/presentationml/2006/main">
-  <p:cSld>
-    <p:spTree>
-      <p:nvGrpSpPr>
-        <p:cNvPr id="1" name=""/>
-        <p:cNvGrpSpPr/>
-        <p:nvPr/>
-      </p:nvGrpSpPr>
-      <p:grpSpPr>
-        <a:xfrm>
-          <a:off x="0" y="0"/>
-          <a:ext cx="0" cy="0"/>
-          <a:chOff x="0" y="0"/>
-          <a:chExt cx="0" cy="0"/>
-        </a:xfrm>
-      </p:grpSpPr>
-      <p:sp>
-        <p:nvSpPr>
-          <p:cNvPr id="2" name="Заголовок 1"/>
-          <p:cNvSpPr>
-            <a:spLocks noGrp="1"/>
-          </p:cNvSpPr>
-          <p:nvPr>
-            <p:ph type="title"/>
-          </p:nvPr>
-        </p:nvSpPr>
-        <p:spPr/>
-        <p:txBody>
-          <a:bodyPr>
-            <a:normAutofit fontScale="90000"/>
-          </a:bodyPr>
-          <a:lstStyle/>
-          <a:p>
-            <a:r>
-              <a:rPr lang="ru-RU" dirty="0" smtClean="0"/>
-              <a:t>Описание функционала разработанного приложения, </a:t>
-            </a:r>
-            <a:r>
-              <a:rPr lang="ru-RU" dirty="0" err="1" smtClean="0"/>
-              <a:t>скриншоты</a:t>
-            </a:r>
-            <a:endParaRPr lang="ru-RU" dirty="0"/>
-          </a:p>
-        </p:txBody>
-      </p:sp>
-      <p:pic>
-        <p:nvPicPr>
-          <p:cNvPr id="5" name="Содержимое 4" descr="Screenshot_2013-05-26-19-22-54.png"/>
-          <p:cNvPicPr>
-            <a:picLocks noGrp="1"/>
-          </p:cNvPicPr>
-          <p:nvPr>
-            <p:ph sz="half" idx="1"/>
-          </p:nvPr>
-        </p:nvPicPr>
-        <p:blipFill>
-          <a:blip r:embed="rId2"/>
-          <a:srcRect t="5086"/>
-          <a:stretch>
-            <a:fillRect/>
-          </a:stretch>
-        </p:blipFill>
-        <p:spPr>
-          <a:xfrm>
-            <a:off x="1071538" y="1928802"/>
-            <a:ext cx="2861093" cy="4525963"/>
-          </a:xfrm>
-          <a:prstGeom prst="rect">
-            <a:avLst/>
-          </a:prstGeom>
-        </p:spPr>
-      </p:pic>
-      <p:pic>
-        <p:nvPicPr>
-          <p:cNvPr id="6" name="Содержимое 5" descr="Screenshot_2013-05-26-19-23-11.png"/>
-          <p:cNvPicPr>
-            <a:picLocks noGrp="1"/>
-          </p:cNvPicPr>
-          <p:nvPr>
-            <p:ph sz="half" idx="2"/>
-          </p:nvPr>
-        </p:nvPicPr>
-        <p:blipFill>
-          <a:blip r:embed="rId3"/>
-          <a:srcRect t="4798"/>
-          <a:stretch>
-            <a:fillRect/>
-          </a:stretch>
-        </p:blipFill>
-        <p:spPr>
-          <a:xfrm>
-            <a:off x="5143504" y="1928802"/>
-            <a:ext cx="2852438" cy="4525963"/>
-          </a:xfrm>
-          <a:prstGeom prst="rect">
-            <a:avLst/>
-          </a:prstGeom>
-        </p:spPr>
-      </p:pic>
-    </p:spTree>
-  </p:cSld>
-  <p:clrMapOvr>
-    <a:masterClrMapping/>
-  </p:clrMapOvr>
-  <p:timing>
-    <p:tnLst>
-      <p:par>
-        <p:cTn id="1" dur="indefinite" restart="never" nodeType="tmRoot"/>
-      </p:par>
-    </p:tnLst>
-  </p:timing>
-</p:sld>
-</file>
-
-<file path=ppt/slides/slide23.xml><?xml version="1.0" encoding="utf-8"?>
-<p:sld xmlns:a="http://schemas.openxmlformats.org/drawingml/2006/main" xmlns:r="http://schemas.openxmlformats.org/officeDocument/2006/relationships" xmlns:p="http://schemas.openxmlformats.org/presentationml/2006/main">
-  <p:cSld>
-    <p:spTree>
-      <p:nvGrpSpPr>
-        <p:cNvPr id="1" name=""/>
-        <p:cNvGrpSpPr/>
-        <p:nvPr/>
-      </p:nvGrpSpPr>
-      <p:grpSpPr>
-        <a:xfrm>
-          <a:off x="0" y="0"/>
-          <a:ext cx="0" cy="0"/>
-          <a:chOff x="0" y="0"/>
-          <a:chExt cx="0" cy="0"/>
-        </a:xfrm>
-      </p:grpSpPr>
-      <p:sp>
-        <p:nvSpPr>
-          <p:cNvPr id="2" name="Заголовок 1"/>
-          <p:cNvSpPr>
-            <a:spLocks noGrp="1"/>
-          </p:cNvSpPr>
-          <p:nvPr>
-            <p:ph type="title"/>
-          </p:nvPr>
-        </p:nvSpPr>
-        <p:spPr/>
-        <p:txBody>
-          <a:bodyPr>
-            <a:normAutofit fontScale="90000"/>
-          </a:bodyPr>
-          <a:lstStyle/>
-          <a:p>
-            <a:r>
-              <a:rPr lang="ru-RU" dirty="0" smtClean="0"/>
-              <a:t>Описание функционала разработанного приложения, </a:t>
-            </a:r>
-            <a:r>
-              <a:rPr lang="ru-RU" dirty="0" err="1" smtClean="0"/>
-              <a:t>скриншоты</a:t>
-            </a:r>
-            <a:endParaRPr lang="ru-RU" dirty="0"/>
-          </a:p>
-        </p:txBody>
-      </p:sp>
-      <p:pic>
-        <p:nvPicPr>
-          <p:cNvPr id="5" name="Содержимое 4" descr="Screenshot_2013-05-26-19-23-58.png"/>
-          <p:cNvPicPr>
-            <a:picLocks noGrp="1"/>
-          </p:cNvPicPr>
-          <p:nvPr>
-            <p:ph sz="half" idx="1"/>
-          </p:nvPr>
-        </p:nvPicPr>
-        <p:blipFill>
-          <a:blip r:embed="rId2"/>
-          <a:srcRect t="4798"/>
-          <a:stretch>
-            <a:fillRect/>
-          </a:stretch>
-        </p:blipFill>
-        <p:spPr>
-          <a:xfrm>
-            <a:off x="3286116" y="2000240"/>
-            <a:ext cx="2852438" cy="4525963"/>
-          </a:xfrm>
-          <a:prstGeom prst="rect">
-            <a:avLst/>
-          </a:prstGeom>
-        </p:spPr>
-      </p:pic>
-    </p:spTree>
-  </p:cSld>
-  <p:clrMapOvr>
-    <a:masterClrMapping/>
-  </p:clrMapOvr>
-  <p:timing>
-    <p:tnLst>
-      <p:par>
-        <p:cTn id="1" dur="indefinite" restart="never" nodeType="tmRoot"/>
-      </p:par>
-    </p:tnLst>
-  </p:timing>
-</p:sld>
-</file>
-
-<file path=ppt/slides/slide24.xml><?xml version="1.0" encoding="utf-8"?>
-<p:sld xmlns:a="http://schemas.openxmlformats.org/drawingml/2006/main" xmlns:r="http://schemas.openxmlformats.org/officeDocument/2006/relationships" xmlns:p="http://schemas.openxmlformats.org/presentationml/2006/main">
-  <p:cSld>
-    <p:spTree>
-      <p:nvGrpSpPr>
-        <p:cNvPr id="1" name=""/>
-        <p:cNvGrpSpPr/>
-        <p:nvPr/>
-      </p:nvGrpSpPr>
-      <p:grpSpPr>
-        <a:xfrm>
-          <a:off x="0" y="0"/>
-          <a:ext cx="0" cy="0"/>
-          <a:chOff x="0" y="0"/>
-          <a:chExt cx="0" cy="0"/>
-        </a:xfrm>
-      </p:grpSpPr>
-      <p:sp>
-        <p:nvSpPr>
-          <p:cNvPr id="2" name="Заголовок 1"/>
-          <p:cNvSpPr>
-            <a:spLocks noGrp="1"/>
-          </p:cNvSpPr>
-          <p:nvPr>
-            <p:ph type="title"/>
-          </p:nvPr>
-        </p:nvSpPr>
-        <p:spPr/>
-        <p:txBody>
-          <a:bodyPr>
-            <a:normAutofit fontScale="90000"/>
-          </a:bodyPr>
-          <a:lstStyle/>
-          <a:p>
-            <a:r>
-              <a:rPr lang="ru-RU" dirty="0" smtClean="0"/>
-              <a:t>Описание функционала разработанного приложения, </a:t>
-            </a:r>
-            <a:r>
-              <a:rPr lang="ru-RU" dirty="0" err="1" smtClean="0"/>
-              <a:t>скриншоты</a:t>
-            </a:r>
-            <a:endParaRPr lang="ru-RU" dirty="0"/>
-          </a:p>
-        </p:txBody>
-      </p:sp>
-      <p:pic>
-        <p:nvPicPr>
-          <p:cNvPr id="5" name="Picture 2"/>
-          <p:cNvPicPr>
-            <a:picLocks noGrp="1"/>
-          </p:cNvPicPr>
-          <p:nvPr>
-            <p:ph sz="half" idx="1"/>
-          </p:nvPr>
-        </p:nvPicPr>
-        <p:blipFill>
-          <a:blip r:embed="rId2">
-            <a:extLst>
-              <a:ext uri="{28A0092B-C50C-407E-A947-70E740481C1C}">
-                <a14:useLocalDpi xmlns="" xmlns:wpc="http://schemas.microsoft.com/office/word/2010/wordprocessingCanvas" xmlns:mc="http://schemas.openxmlformats.org/markup-compatibility/2006" xmlns:o="urn:schemas-microsoft-com:office:office" xmlns:m="http://schemas.openxmlformats.org/officeDocument/2006/math" xmlns:v="urn:schemas-microsoft-com:vml" xmlns:wp14="http://schemas.microsoft.com/office/word/2010/wordprocessingDrawing" xmlns:wp="http://schemas.openxmlformats.org/drawingml/2006/wordprocessingDrawing" xmlns:w10="urn:schemas-microsoft-com:office:word" xmlns:w="http://schemas.openxmlformats.org/wordprocessingml/2006/main" xmlns:w14="http://schemas.microsoft.com/office/word/2010/wordml" xmlns:wpg="http://schemas.microsoft.com/office/word/2010/wordprocessingGroup" xmlns:wpi="http://schemas.microsoft.com/office/word/2010/wordprocessingInk" xmlns:wne="http://schemas.microsoft.com/office/word/2006/wordml" xmlns:wps="http://schemas.microsoft.com/office/word/2010/wordprocessingShape" xmlns:a14="http://schemas.microsoft.com/office/drawing/2010/main" xmlns:pic="http://schemas.openxmlformats.org/drawingml/2006/picture" xmlns:lc="http://schemas.openxmlformats.org/drawingml/2006/lockedCanvas" val="0"/>
-              </a:ext>
-            </a:extLst>
-          </a:blip>
-          <a:stretch>
-            <a:fillRect/>
-          </a:stretch>
-        </p:blipFill>
-        <p:spPr>
-          <a:xfrm>
-            <a:off x="457200" y="2651601"/>
-            <a:ext cx="4038600" cy="2423160"/>
-          </a:xfrm>
-          <a:prstGeom prst="rect">
-            <a:avLst/>
-          </a:prstGeom>
-        </p:spPr>
-      </p:pic>
-      <p:pic>
-        <p:nvPicPr>
-          <p:cNvPr id="6" name="Picture 10"/>
-          <p:cNvPicPr>
-            <a:picLocks noGrp="1"/>
-          </p:cNvPicPr>
-          <p:nvPr>
-            <p:ph sz="half" idx="2"/>
-          </p:nvPr>
-        </p:nvPicPr>
-        <p:blipFill>
-          <a:blip r:embed="rId3">
-            <a:extLst>
-              <a:ext uri="{28A0092B-C50C-407E-A947-70E740481C1C}">
-                <a14:useLocalDpi xmlns="" xmlns:wpc="http://schemas.microsoft.com/office/word/2010/wordprocessingCanvas" xmlns:mc="http://schemas.openxmlformats.org/markup-compatibility/2006" xmlns:o="urn:schemas-microsoft-com:office:office" xmlns:m="http://schemas.openxmlformats.org/officeDocument/2006/math" xmlns:v="urn:schemas-microsoft-com:vml" xmlns:wp14="http://schemas.microsoft.com/office/word/2010/wordprocessingDrawing" xmlns:wp="http://schemas.openxmlformats.org/drawingml/2006/wordprocessingDrawing" xmlns:w10="urn:schemas-microsoft-com:office:word" xmlns:w="http://schemas.openxmlformats.org/wordprocessingml/2006/main" xmlns:w14="http://schemas.microsoft.com/office/word/2010/wordml" xmlns:wpg="http://schemas.microsoft.com/office/word/2010/wordprocessingGroup" xmlns:wpi="http://schemas.microsoft.com/office/word/2010/wordprocessingInk" xmlns:wne="http://schemas.microsoft.com/office/word/2006/wordml" xmlns:wps="http://schemas.microsoft.com/office/word/2010/wordprocessingShape" xmlns:a14="http://schemas.microsoft.com/office/drawing/2010/main" xmlns:pic="http://schemas.openxmlformats.org/drawingml/2006/picture" xmlns:lc="http://schemas.openxmlformats.org/drawingml/2006/lockedCanvas" val="0"/>
-              </a:ext>
-            </a:extLst>
-          </a:blip>
-          <a:stretch>
-            <a:fillRect/>
-          </a:stretch>
-        </p:blipFill>
-        <p:spPr>
-          <a:xfrm>
-            <a:off x="4648200" y="2651601"/>
-            <a:ext cx="4038600" cy="2423160"/>
-          </a:xfrm>
-          <a:prstGeom prst="rect">
-            <a:avLst/>
-          </a:prstGeom>
-        </p:spPr>
-      </p:pic>
-    </p:spTree>
-  </p:cSld>
-  <p:clrMapOvr>
-    <a:masterClrMapping/>
-  </p:clrMapOvr>
-  <p:timing>
-    <p:tnLst>
-      <p:par>
-        <p:cTn id="1" dur="indefinite" restart="never" nodeType="tmRoot"/>
-      </p:par>
-    </p:tnLst>
-  </p:timing>
-</p:sld>
-</file>
-
-<file path=ppt/slides/slide25.xml><?xml version="1.0" encoding="utf-8"?>
-<p:sld xmlns:a="http://schemas.openxmlformats.org/drawingml/2006/main" xmlns:r="http://schemas.openxmlformats.org/officeDocument/2006/relationships" xmlns:p="http://schemas.openxmlformats.org/presentationml/2006/main">
-  <p:cSld>
-    <p:spTree>
-      <p:nvGrpSpPr>
-        <p:cNvPr id="1" name=""/>
-        <p:cNvGrpSpPr/>
-        <p:nvPr/>
-      </p:nvGrpSpPr>
-      <p:grpSpPr>
-        <a:xfrm>
-          <a:off x="0" y="0"/>
-          <a:ext cx="0" cy="0"/>
-          <a:chOff x="0" y="0"/>
-          <a:chExt cx="0" cy="0"/>
-        </a:xfrm>
-      </p:grpSpPr>
-      <p:sp>
-        <p:nvSpPr>
-          <p:cNvPr id="2" name="Заголовок 1"/>
-          <p:cNvSpPr>
-            <a:spLocks noGrp="1"/>
-          </p:cNvSpPr>
-          <p:nvPr>
-            <p:ph type="title"/>
-          </p:nvPr>
-        </p:nvSpPr>
-        <p:spPr/>
-        <p:txBody>
           <a:bodyPr/>
           <a:lstStyle/>
           <a:p>
@@ -5489,6 +5572,30 @@
               <a:t>Спасибо за внимание!</a:t>
             </a:r>
             <a:endParaRPr lang="ru-RU" dirty="0"/>
+          </a:p>
+        </p:txBody>
+      </p:sp>
+      <p:sp>
+        <p:nvSpPr>
+          <p:cNvPr id="3" name="Номер слайда 2"/>
+          <p:cNvSpPr>
+            <a:spLocks noGrp="1"/>
+          </p:cNvSpPr>
+          <p:nvPr>
+            <p:ph type="sldNum" sz="quarter" idx="12"/>
+          </p:nvPr>
+        </p:nvSpPr>
+        <p:spPr/>
+        <p:txBody>
+          <a:bodyPr/>
+          <a:lstStyle/>
+          <a:p>
+            <a:fld id="{9A39E707-F3CE-4BEB-9583-BB36F29193FA}" type="slidenum">
+              <a:rPr lang="ru-RU" smtClean="0"/>
+              <a:pPr/>
+              <a:t>21</a:t>
+            </a:fld>
+            <a:endParaRPr lang="ru-RU"/>
           </a:p>
         </p:txBody>
       </p:sp>
@@ -5610,6 +5717,30 @@
               <a:buNone/>
             </a:pPr>
             <a:endParaRPr lang="ru-RU" dirty="0"/>
+          </a:p>
+        </p:txBody>
+      </p:sp>
+      <p:sp>
+        <p:nvSpPr>
+          <p:cNvPr id="4" name="Номер слайда 3"/>
+          <p:cNvSpPr>
+            <a:spLocks noGrp="1"/>
+          </p:cNvSpPr>
+          <p:nvPr>
+            <p:ph type="sldNum" sz="quarter" idx="12"/>
+          </p:nvPr>
+        </p:nvSpPr>
+        <p:spPr/>
+        <p:txBody>
+          <a:bodyPr/>
+          <a:lstStyle/>
+          <a:p>
+            <a:fld id="{9A39E707-F3CE-4BEB-9583-BB36F29193FA}" type="slidenum">
+              <a:rPr lang="ru-RU" smtClean="0"/>
+              <a:pPr/>
+              <a:t>3</a:t>
+            </a:fld>
+            <a:endParaRPr lang="ru-RU"/>
           </a:p>
         </p:txBody>
       </p:sp>
@@ -5745,6 +5876,30 @@
           </a:prstGeom>
         </p:spPr>
       </p:pic>
+      <p:sp>
+        <p:nvSpPr>
+          <p:cNvPr id="6" name="Номер слайда 5"/>
+          <p:cNvSpPr>
+            <a:spLocks noGrp="1"/>
+          </p:cNvSpPr>
+          <p:nvPr>
+            <p:ph type="sldNum" sz="quarter" idx="12"/>
+          </p:nvPr>
+        </p:nvSpPr>
+        <p:spPr/>
+        <p:txBody>
+          <a:bodyPr/>
+          <a:lstStyle/>
+          <a:p>
+            <a:fld id="{9A39E707-F3CE-4BEB-9583-BB36F29193FA}" type="slidenum">
+              <a:rPr lang="ru-RU" smtClean="0"/>
+              <a:pPr/>
+              <a:t>4</a:t>
+            </a:fld>
+            <a:endParaRPr lang="ru-RU"/>
+          </a:p>
+        </p:txBody>
+      </p:sp>
     </p:spTree>
   </p:cSld>
   <p:clrMapOvr>
@@ -5868,6 +6023,30 @@
           </a:prstGeom>
         </p:spPr>
       </p:pic>
+      <p:sp>
+        <p:nvSpPr>
+          <p:cNvPr id="6" name="Номер слайда 5"/>
+          <p:cNvSpPr>
+            <a:spLocks noGrp="1"/>
+          </p:cNvSpPr>
+          <p:nvPr>
+            <p:ph type="sldNum" sz="quarter" idx="12"/>
+          </p:nvPr>
+        </p:nvSpPr>
+        <p:spPr/>
+        <p:txBody>
+          <a:bodyPr/>
+          <a:lstStyle/>
+          <a:p>
+            <a:fld id="{9A39E707-F3CE-4BEB-9583-BB36F29193FA}" type="slidenum">
+              <a:rPr lang="ru-RU" smtClean="0"/>
+              <a:pPr/>
+              <a:t>5</a:t>
+            </a:fld>
+            <a:endParaRPr lang="ru-RU"/>
+          </a:p>
+        </p:txBody>
+      </p:sp>
     </p:spTree>
   </p:cSld>
   <p:clrMapOvr>
@@ -6004,6 +6183,30 @@
           <a:noFill/>
         </p:spPr>
       </p:pic>
+      <p:sp>
+        <p:nvSpPr>
+          <p:cNvPr id="6" name="Номер слайда 5"/>
+          <p:cNvSpPr>
+            <a:spLocks noGrp="1"/>
+          </p:cNvSpPr>
+          <p:nvPr>
+            <p:ph type="sldNum" sz="quarter" idx="12"/>
+          </p:nvPr>
+        </p:nvSpPr>
+        <p:spPr/>
+        <p:txBody>
+          <a:bodyPr/>
+          <a:lstStyle/>
+          <a:p>
+            <a:fld id="{9A39E707-F3CE-4BEB-9583-BB36F29193FA}" type="slidenum">
+              <a:rPr lang="ru-RU" smtClean="0"/>
+              <a:pPr/>
+              <a:t>6</a:t>
+            </a:fld>
+            <a:endParaRPr lang="ru-RU"/>
+          </a:p>
+        </p:txBody>
+      </p:sp>
     </p:spTree>
   </p:cSld>
   <p:clrMapOvr>
@@ -6123,6 +6326,30 @@
           </a:ln>
         </p:spPr>
       </p:pic>
+      <p:sp>
+        <p:nvSpPr>
+          <p:cNvPr id="5" name="Номер слайда 4"/>
+          <p:cNvSpPr>
+            <a:spLocks noGrp="1"/>
+          </p:cNvSpPr>
+          <p:nvPr>
+            <p:ph type="sldNum" sz="quarter" idx="12"/>
+          </p:nvPr>
+        </p:nvSpPr>
+        <p:spPr/>
+        <p:txBody>
+          <a:bodyPr/>
+          <a:lstStyle/>
+          <a:p>
+            <a:fld id="{9A39E707-F3CE-4BEB-9583-BB36F29193FA}" type="slidenum">
+              <a:rPr lang="ru-RU" smtClean="0"/>
+              <a:pPr/>
+              <a:t>7</a:t>
+            </a:fld>
+            <a:endParaRPr lang="ru-RU"/>
+          </a:p>
+        </p:txBody>
+      </p:sp>
     </p:spTree>
   </p:cSld>
   <p:clrMapOvr>
@@ -6233,6 +6460,30 @@
           </a:ln>
         </p:spPr>
       </p:pic>
+      <p:sp>
+        <p:nvSpPr>
+          <p:cNvPr id="7" name="Номер слайда 6"/>
+          <p:cNvSpPr>
+            <a:spLocks noGrp="1"/>
+          </p:cNvSpPr>
+          <p:nvPr>
+            <p:ph type="sldNum" sz="quarter" idx="12"/>
+          </p:nvPr>
+        </p:nvSpPr>
+        <p:spPr/>
+        <p:txBody>
+          <a:bodyPr/>
+          <a:lstStyle/>
+          <a:p>
+            <a:fld id="{9A39E707-F3CE-4BEB-9583-BB36F29193FA}" type="slidenum">
+              <a:rPr lang="ru-RU" smtClean="0"/>
+              <a:pPr/>
+              <a:t>8</a:t>
+            </a:fld>
+            <a:endParaRPr lang="ru-RU"/>
+          </a:p>
+        </p:txBody>
+      </p:sp>
     </p:spTree>
   </p:cSld>
   <p:clrMapOvr>
@@ -6376,6 +6627,30 @@
           </a:p>
           <a:p>
             <a:endParaRPr lang="ru-RU" dirty="0"/>
+          </a:p>
+        </p:txBody>
+      </p:sp>
+      <p:sp>
+        <p:nvSpPr>
+          <p:cNvPr id="4" name="Номер слайда 3"/>
+          <p:cNvSpPr>
+            <a:spLocks noGrp="1"/>
+          </p:cNvSpPr>
+          <p:nvPr>
+            <p:ph type="sldNum" sz="quarter" idx="12"/>
+          </p:nvPr>
+        </p:nvSpPr>
+        <p:spPr/>
+        <p:txBody>
+          <a:bodyPr/>
+          <a:lstStyle/>
+          <a:p>
+            <a:fld id="{9A39E707-F3CE-4BEB-9583-BB36F29193FA}" type="slidenum">
+              <a:rPr lang="ru-RU" smtClean="0"/>
+              <a:pPr/>
+              <a:t>9</a:t>
+            </a:fld>
+            <a:endParaRPr lang="ru-RU"/>
           </a:p>
         </p:txBody>
       </p:sp>
@@ -6675,4 +6950,287 @@
   <a:objectDefaults/>
   <a:extraClrSchemeLst/>
 </a:theme>
+</file>
+
+<file path=ppt/theme/theme2.xml><?xml version="1.0" encoding="utf-8"?>
+<a:theme xmlns:a="http://schemas.openxmlformats.org/drawingml/2006/main" name="Тема Office">
+  <a:themeElements>
+    <a:clrScheme name="Стандартная">
+      <a:dk1>
+        <a:sysClr val="windowText" lastClr="000000"/>
+      </a:dk1>
+      <a:lt1>
+        <a:sysClr val="window" lastClr="FFFFFF"/>
+      </a:lt1>
+      <a:dk2>
+        <a:srgbClr val="1F497D"/>
+      </a:dk2>
+      <a:lt2>
+        <a:srgbClr val="EEECE1"/>
+      </a:lt2>
+      <a:accent1>
+        <a:srgbClr val="4F81BD"/>
+      </a:accent1>
+      <a:accent2>
+        <a:srgbClr val="C0504D"/>
+      </a:accent2>
+      <a:accent3>
+        <a:srgbClr val="9BBB59"/>
+      </a:accent3>
+      <a:accent4>
+        <a:srgbClr val="8064A2"/>
+      </a:accent4>
+      <a:accent5>
+        <a:srgbClr val="4BACC6"/>
+      </a:accent5>
+      <a:accent6>
+        <a:srgbClr val="F79646"/>
+      </a:accent6>
+      <a:hlink>
+        <a:srgbClr val="0000FF"/>
+      </a:hlink>
+      <a:folHlink>
+        <a:srgbClr val="800080"/>
+      </a:folHlink>
+    </a:clrScheme>
+    <a:fontScheme name="Стандартная">
+      <a:majorFont>
+        <a:latin typeface="Calibri"/>
+        <a:ea typeface=""/>
+        <a:cs typeface=""/>
+        <a:font script="Jpan" typeface="ＭＳ Ｐゴシック"/>
+        <a:font script="Hang" typeface="맑은 고딕"/>
+        <a:font script="Hans" typeface="宋体"/>
+        <a:font script="Hant" typeface="新細明體"/>
+        <a:font script="Arab" typeface="Times New Roman"/>
+        <a:font script="Hebr" typeface="Times New Roman"/>
+        <a:font script="Thai" typeface="Angsana New"/>
+        <a:font script="Ethi" typeface="Nyala"/>
+        <a:font script="Beng" typeface="Vrinda"/>
+        <a:font script="Gujr" typeface="Shruti"/>
+        <a:font script="Khmr" typeface="MoolBoran"/>
+        <a:font script="Knda" typeface="Tunga"/>
+        <a:font script="Guru" typeface="Raavi"/>
+        <a:font script="Cans" typeface="Euphemia"/>
+        <a:font script="Cher" typeface="Plantagenet Cherokee"/>
+        <a:font script="Yiii" typeface="Microsoft Yi Baiti"/>
+        <a:font script="Tibt" typeface="Microsoft Himalaya"/>
+        <a:font script="Thaa" typeface="MV Boli"/>
+        <a:font script="Deva" typeface="Mangal"/>
+        <a:font script="Telu" typeface="Gautami"/>
+        <a:font script="Taml" typeface="Latha"/>
+        <a:font script="Syrc" typeface="Estrangelo Edessa"/>
+        <a:font script="Orya" typeface="Kalinga"/>
+        <a:font script="Mlym" typeface="Kartika"/>
+        <a:font script="Laoo" typeface="DokChampa"/>
+        <a:font script="Sinh" typeface="Iskoola Pota"/>
+        <a:font script="Mong" typeface="Mongolian Baiti"/>
+        <a:font script="Viet" typeface="Times New Roman"/>
+        <a:font script="Uigh" typeface="Microsoft Uighur"/>
+      </a:majorFont>
+      <a:minorFont>
+        <a:latin typeface="Calibri"/>
+        <a:ea typeface=""/>
+        <a:cs typeface=""/>
+        <a:font script="Jpan" typeface="ＭＳ Ｐゴシック"/>
+        <a:font script="Hang" typeface="맑은 고딕"/>
+        <a:font script="Hans" typeface="宋体"/>
+        <a:font script="Hant" typeface="新細明體"/>
+        <a:font script="Arab" typeface="Arial"/>
+        <a:font script="Hebr" typeface="Arial"/>
+        <a:font script="Thai" typeface="Cordia New"/>
+        <a:font script="Ethi" typeface="Nyala"/>
+        <a:font script="Beng" typeface="Vrinda"/>
+        <a:font script="Gujr" typeface="Shruti"/>
+        <a:font script="Khmr" typeface="DaunPenh"/>
+        <a:font script="Knda" typeface="Tunga"/>
+        <a:font script="Guru" typeface="Raavi"/>
+        <a:font script="Cans" typeface="Euphemia"/>
+        <a:font script="Cher" typeface="Plantagenet Cherokee"/>
+        <a:font script="Yiii" typeface="Microsoft Yi Baiti"/>
+        <a:font script="Tibt" typeface="Microsoft Himalaya"/>
+        <a:font script="Thaa" typeface="MV Boli"/>
+        <a:font script="Deva" typeface="Mangal"/>
+        <a:font script="Telu" typeface="Gautami"/>
+        <a:font script="Taml" typeface="Latha"/>
+        <a:font script="Syrc" typeface="Estrangelo Edessa"/>
+        <a:font script="Orya" typeface="Kalinga"/>
+        <a:font script="Mlym" typeface="Kartika"/>
+        <a:font script="Laoo" typeface="DokChampa"/>
+        <a:font script="Sinh" typeface="Iskoola Pota"/>
+        <a:font script="Mong" typeface="Mongolian Baiti"/>
+        <a:font script="Viet" typeface="Arial"/>
+        <a:font script="Uigh" typeface="Microsoft Uighur"/>
+      </a:minorFont>
+    </a:fontScheme>
+    <a:fmtScheme name="Стандартная">
+      <a:fillStyleLst>
+        <a:solidFill>
+          <a:schemeClr val="phClr"/>
+        </a:solidFill>
+        <a:gradFill rotWithShape="1">
+          <a:gsLst>
+            <a:gs pos="0">
+              <a:schemeClr val="phClr">
+                <a:tint val="50000"/>
+                <a:satMod val="300000"/>
+              </a:schemeClr>
+            </a:gs>
+            <a:gs pos="35000">
+              <a:schemeClr val="phClr">
+                <a:tint val="37000"/>
+                <a:satMod val="300000"/>
+              </a:schemeClr>
+            </a:gs>
+            <a:gs pos="100000">
+              <a:schemeClr val="phClr">
+                <a:tint val="15000"/>
+                <a:satMod val="350000"/>
+              </a:schemeClr>
+            </a:gs>
+          </a:gsLst>
+          <a:lin ang="16200000" scaled="1"/>
+        </a:gradFill>
+        <a:gradFill rotWithShape="1">
+          <a:gsLst>
+            <a:gs pos="0">
+              <a:schemeClr val="phClr">
+                <a:shade val="51000"/>
+                <a:satMod val="130000"/>
+              </a:schemeClr>
+            </a:gs>
+            <a:gs pos="80000">
+              <a:schemeClr val="phClr">
+                <a:shade val="93000"/>
+                <a:satMod val="130000"/>
+              </a:schemeClr>
+            </a:gs>
+            <a:gs pos="100000">
+              <a:schemeClr val="phClr">
+                <a:shade val="94000"/>
+                <a:satMod val="135000"/>
+              </a:schemeClr>
+            </a:gs>
+          </a:gsLst>
+          <a:lin ang="16200000" scaled="0"/>
+        </a:gradFill>
+      </a:fillStyleLst>
+      <a:lnStyleLst>
+        <a:ln w="9525" cap="flat" cmpd="sng" algn="ctr">
+          <a:solidFill>
+            <a:schemeClr val="phClr">
+              <a:shade val="95000"/>
+              <a:satMod val="105000"/>
+            </a:schemeClr>
+          </a:solidFill>
+          <a:prstDash val="solid"/>
+        </a:ln>
+        <a:ln w="25400" cap="flat" cmpd="sng" algn="ctr">
+          <a:solidFill>
+            <a:schemeClr val="phClr"/>
+          </a:solidFill>
+          <a:prstDash val="solid"/>
+        </a:ln>
+        <a:ln w="38100" cap="flat" cmpd="sng" algn="ctr">
+          <a:solidFill>
+            <a:schemeClr val="phClr"/>
+          </a:solidFill>
+          <a:prstDash val="solid"/>
+        </a:ln>
+      </a:lnStyleLst>
+      <a:effectStyleLst>
+        <a:effectStyle>
+          <a:effectLst>
+            <a:outerShdw blurRad="40000" dist="20000" dir="5400000" rotWithShape="0">
+              <a:srgbClr val="000000">
+                <a:alpha val="38000"/>
+              </a:srgbClr>
+            </a:outerShdw>
+          </a:effectLst>
+        </a:effectStyle>
+        <a:effectStyle>
+          <a:effectLst>
+            <a:outerShdw blurRad="40000" dist="23000" dir="5400000" rotWithShape="0">
+              <a:srgbClr val="000000">
+                <a:alpha val="35000"/>
+              </a:srgbClr>
+            </a:outerShdw>
+          </a:effectLst>
+        </a:effectStyle>
+        <a:effectStyle>
+          <a:effectLst>
+            <a:outerShdw blurRad="40000" dist="23000" dir="5400000" rotWithShape="0">
+              <a:srgbClr val="000000">
+                <a:alpha val="35000"/>
+              </a:srgbClr>
+            </a:outerShdw>
+          </a:effectLst>
+          <a:scene3d>
+            <a:camera prst="orthographicFront">
+              <a:rot lat="0" lon="0" rev="0"/>
+            </a:camera>
+            <a:lightRig rig="threePt" dir="t">
+              <a:rot lat="0" lon="0" rev="1200000"/>
+            </a:lightRig>
+          </a:scene3d>
+          <a:sp3d>
+            <a:bevelT w="63500" h="25400"/>
+          </a:sp3d>
+        </a:effectStyle>
+      </a:effectStyleLst>
+      <a:bgFillStyleLst>
+        <a:solidFill>
+          <a:schemeClr val="phClr"/>
+        </a:solidFill>
+        <a:gradFill rotWithShape="1">
+          <a:gsLst>
+            <a:gs pos="0">
+              <a:schemeClr val="phClr">
+                <a:tint val="40000"/>
+                <a:satMod val="350000"/>
+              </a:schemeClr>
+            </a:gs>
+            <a:gs pos="40000">
+              <a:schemeClr val="phClr">
+                <a:tint val="45000"/>
+                <a:shade val="99000"/>
+                <a:satMod val="350000"/>
+              </a:schemeClr>
+            </a:gs>
+            <a:gs pos="100000">
+              <a:schemeClr val="phClr">
+                <a:shade val="20000"/>
+                <a:satMod val="255000"/>
+              </a:schemeClr>
+            </a:gs>
+          </a:gsLst>
+          <a:path path="circle">
+            <a:fillToRect l="50000" t="-80000" r="50000" b="180000"/>
+          </a:path>
+        </a:gradFill>
+        <a:gradFill rotWithShape="1">
+          <a:gsLst>
+            <a:gs pos="0">
+              <a:schemeClr val="phClr">
+                <a:tint val="80000"/>
+                <a:satMod val="300000"/>
+              </a:schemeClr>
+            </a:gs>
+            <a:gs pos="100000">
+              <a:schemeClr val="phClr">
+                <a:shade val="30000"/>
+                <a:satMod val="200000"/>
+              </a:schemeClr>
+            </a:gs>
+          </a:gsLst>
+          <a:path path="circle">
+            <a:fillToRect l="50000" t="50000" r="50000" b="50000"/>
+          </a:path>
+        </a:gradFill>
+      </a:bgFillStyleLst>
+    </a:fmtScheme>
+  </a:themeElements>
+  <a:objectDefaults/>
+  <a:extraClrSchemeLst/>
+</a:theme>
 </file>
</xml_diff>